<commit_message>
code updated with presentation, test and dependencies
</commit_message>
<xml_diff>
--- a/diagrams.pptx
+++ b/diagrams.pptx
@@ -6,6 +6,8 @@
   </p:sldMasterIdLst>
   <p:sldIdLst>
     <p:sldId id="256" r:id="rId2"/>
+    <p:sldId id="258" r:id="rId3"/>
+    <p:sldId id="257" r:id="rId4"/>
   </p:sldIdLst>
   <p:sldSz cx="12192000" cy="6858000"/>
   <p:notesSz cx="6858000" cy="9144000"/>
@@ -104,6 +106,11 @@
       </a:defRPr>
     </a:lvl9pPr>
   </p:defaultTextStyle>
+  <p:extLst>
+    <p:ext uri="{EFAFB233-063F-42B5-8137-9DF3F51BA10A}">
+      <p15:sldGuideLst xmlns:p15="http://schemas.microsoft.com/office/powerpoint/2012/main"/>
+    </p:ext>
+  </p:extLst>
 </p:presentation>
 </file>
 
@@ -256,7 +263,7 @@
           <a:p>
             <a:fld id="{A1541985-5BA2-4925-8FDB-6F2F9B76D2FD}" type="datetimeFigureOut">
               <a:rPr lang="en-IN" smtClean="0"/>
-              <a:t>28-02-2024</a:t>
+              <a:t>01-03-2024</a:t>
             </a:fld>
             <a:endParaRPr lang="en-IN"/>
           </a:p>
@@ -456,7 +463,7 @@
           <a:p>
             <a:fld id="{A1541985-5BA2-4925-8FDB-6F2F9B76D2FD}" type="datetimeFigureOut">
               <a:rPr lang="en-IN" smtClean="0"/>
-              <a:t>28-02-2024</a:t>
+              <a:t>01-03-2024</a:t>
             </a:fld>
             <a:endParaRPr lang="en-IN"/>
           </a:p>
@@ -666,7 +673,7 @@
           <a:p>
             <a:fld id="{A1541985-5BA2-4925-8FDB-6F2F9B76D2FD}" type="datetimeFigureOut">
               <a:rPr lang="en-IN" smtClean="0"/>
-              <a:t>28-02-2024</a:t>
+              <a:t>01-03-2024</a:t>
             </a:fld>
             <a:endParaRPr lang="en-IN"/>
           </a:p>
@@ -866,7 +873,7 @@
           <a:p>
             <a:fld id="{A1541985-5BA2-4925-8FDB-6F2F9B76D2FD}" type="datetimeFigureOut">
               <a:rPr lang="en-IN" smtClean="0"/>
-              <a:t>28-02-2024</a:t>
+              <a:t>01-03-2024</a:t>
             </a:fld>
             <a:endParaRPr lang="en-IN"/>
           </a:p>
@@ -1142,7 +1149,7 @@
           <a:p>
             <a:fld id="{A1541985-5BA2-4925-8FDB-6F2F9B76D2FD}" type="datetimeFigureOut">
               <a:rPr lang="en-IN" smtClean="0"/>
-              <a:t>28-02-2024</a:t>
+              <a:t>01-03-2024</a:t>
             </a:fld>
             <a:endParaRPr lang="en-IN"/>
           </a:p>
@@ -1410,7 +1417,7 @@
           <a:p>
             <a:fld id="{A1541985-5BA2-4925-8FDB-6F2F9B76D2FD}" type="datetimeFigureOut">
               <a:rPr lang="en-IN" smtClean="0"/>
-              <a:t>28-02-2024</a:t>
+              <a:t>01-03-2024</a:t>
             </a:fld>
             <a:endParaRPr lang="en-IN"/>
           </a:p>
@@ -1825,7 +1832,7 @@
           <a:p>
             <a:fld id="{A1541985-5BA2-4925-8FDB-6F2F9B76D2FD}" type="datetimeFigureOut">
               <a:rPr lang="en-IN" smtClean="0"/>
-              <a:t>28-02-2024</a:t>
+              <a:t>01-03-2024</a:t>
             </a:fld>
             <a:endParaRPr lang="en-IN"/>
           </a:p>
@@ -1967,7 +1974,7 @@
           <a:p>
             <a:fld id="{A1541985-5BA2-4925-8FDB-6F2F9B76D2FD}" type="datetimeFigureOut">
               <a:rPr lang="en-IN" smtClean="0"/>
-              <a:t>28-02-2024</a:t>
+              <a:t>01-03-2024</a:t>
             </a:fld>
             <a:endParaRPr lang="en-IN"/>
           </a:p>
@@ -2080,7 +2087,7 @@
           <a:p>
             <a:fld id="{A1541985-5BA2-4925-8FDB-6F2F9B76D2FD}" type="datetimeFigureOut">
               <a:rPr lang="en-IN" smtClean="0"/>
-              <a:t>28-02-2024</a:t>
+              <a:t>01-03-2024</a:t>
             </a:fld>
             <a:endParaRPr lang="en-IN"/>
           </a:p>
@@ -2393,7 +2400,7 @@
           <a:p>
             <a:fld id="{A1541985-5BA2-4925-8FDB-6F2F9B76D2FD}" type="datetimeFigureOut">
               <a:rPr lang="en-IN" smtClean="0"/>
-              <a:t>28-02-2024</a:t>
+              <a:t>01-03-2024</a:t>
             </a:fld>
             <a:endParaRPr lang="en-IN"/>
           </a:p>
@@ -2682,7 +2689,7 @@
           <a:p>
             <a:fld id="{A1541985-5BA2-4925-8FDB-6F2F9B76D2FD}" type="datetimeFigureOut">
               <a:rPr lang="en-IN" smtClean="0"/>
-              <a:t>28-02-2024</a:t>
+              <a:t>01-03-2024</a:t>
             </a:fld>
             <a:endParaRPr lang="en-IN"/>
           </a:p>
@@ -2925,7 +2932,7 @@
           <a:p>
             <a:fld id="{A1541985-5BA2-4925-8FDB-6F2F9B76D2FD}" type="datetimeFigureOut">
               <a:rPr lang="en-IN" smtClean="0"/>
-              <a:t>28-02-2024</a:t>
+              <a:t>01-03-2024</a:t>
             </a:fld>
             <a:endParaRPr lang="en-IN"/>
           </a:p>
@@ -3344,10 +3351,10 @@
       </p:grpSpPr>
       <p:sp>
         <p:nvSpPr>
-          <p:cNvPr id="4" name="Rectangle: Rounded Corners 3">
-            <a:extLst>
-              <a:ext uri="{FF2B5EF4-FFF2-40B4-BE49-F238E27FC236}">
-                <a16:creationId xmlns:a16="http://schemas.microsoft.com/office/drawing/2014/main" id="{FB9FF721-4C15-494C-8BE1-345E928F75D8}"/>
+          <p:cNvPr id="6" name="Rectangle: Rounded Corners 5">
+            <a:extLst>
+              <a:ext uri="{FF2B5EF4-FFF2-40B4-BE49-F238E27FC236}">
+                <a16:creationId xmlns:a16="http://schemas.microsoft.com/office/drawing/2014/main" id="{A69BECE9-7BDF-476F-A414-9E046299323D}"/>
               </a:ext>
             </a:extLst>
           </p:cNvPr>
@@ -3356,8 +3363,8 @@
         </p:nvSpPr>
         <p:spPr>
           <a:xfrm>
-            <a:off x="1313934" y="3103605"/>
-            <a:ext cx="2990335" cy="650789"/>
+            <a:off x="380309" y="4124309"/>
+            <a:ext cx="1695193" cy="402718"/>
           </a:xfrm>
           <a:prstGeom prst="roundRect">
             <a:avLst/>
@@ -3385,23 +3392,19 @@
           <a:p>
             <a:pPr algn="ctr"/>
             <a:r>
-              <a:rPr lang="en-US" dirty="0"/>
-              <a:t>attendance-service-</a:t>
-            </a:r>
-            <a:r>
-              <a:rPr lang="en-US" dirty="0" err="1"/>
-              <a:t>graphql</a:t>
-            </a:r>
-            <a:endParaRPr lang="en-IN" dirty="0"/>
-          </a:p>
-        </p:txBody>
-      </p:sp>
-      <p:sp>
-        <p:nvSpPr>
-          <p:cNvPr id="5" name="Rectangle: Rounded Corners 4">
-            <a:extLst>
-              <a:ext uri="{FF2B5EF4-FFF2-40B4-BE49-F238E27FC236}">
-                <a16:creationId xmlns:a16="http://schemas.microsoft.com/office/drawing/2014/main" id="{A66071BF-301C-45C5-83B3-1740A818DE3F}"/>
+              <a:rPr lang="en-US" sz="1200" dirty="0"/>
+              <a:t>attendance-event-store</a:t>
+            </a:r>
+            <a:endParaRPr lang="en-IN" sz="1200" dirty="0"/>
+          </a:p>
+        </p:txBody>
+      </p:sp>
+      <p:sp>
+        <p:nvSpPr>
+          <p:cNvPr id="7" name="Rectangle: Rounded Corners 6">
+            <a:extLst>
+              <a:ext uri="{FF2B5EF4-FFF2-40B4-BE49-F238E27FC236}">
+                <a16:creationId xmlns:a16="http://schemas.microsoft.com/office/drawing/2014/main" id="{976297CF-38CA-4344-93E4-A8C84D5944B5}"/>
               </a:ext>
             </a:extLst>
           </p:cNvPr>
@@ -3410,12 +3413,18 @@
         </p:nvSpPr>
         <p:spPr>
           <a:xfrm>
-            <a:off x="4600832" y="3103605"/>
-            <a:ext cx="2990335" cy="650789"/>
+            <a:off x="4603536" y="463261"/>
+            <a:ext cx="2288622" cy="415782"/>
           </a:xfrm>
           <a:prstGeom prst="roundRect">
             <a:avLst/>
           </a:prstGeom>
+          <a:solidFill>
+            <a:schemeClr val="accent2">
+              <a:lumMod val="60000"/>
+              <a:lumOff val="40000"/>
+            </a:schemeClr>
+          </a:solidFill>
         </p:spPr>
         <p:style>
           <a:lnRef idx="2">
@@ -3439,19 +3448,43 @@
           <a:p>
             <a:pPr algn="ctr"/>
             <a:r>
-              <a:rPr lang="en-US" dirty="0"/>
-              <a:t>attendance-system-service</a:t>
-            </a:r>
-            <a:endParaRPr lang="en-IN" dirty="0"/>
-          </a:p>
-        </p:txBody>
-      </p:sp>
-      <p:sp>
-        <p:nvSpPr>
-          <p:cNvPr id="6" name="Rectangle: Rounded Corners 5">
-            <a:extLst>
-              <a:ext uri="{FF2B5EF4-FFF2-40B4-BE49-F238E27FC236}">
-                <a16:creationId xmlns:a16="http://schemas.microsoft.com/office/drawing/2014/main" id="{A69BECE9-7BDF-476F-A414-9E046299323D}"/>
+              <a:rPr lang="en-US" sz="1200" dirty="0">
+                <a:solidFill>
+                  <a:schemeClr val="tx1"/>
+                </a:solidFill>
+              </a:rPr>
+              <a:t>attendance-system-</a:t>
+            </a:r>
+            <a:r>
+              <a:rPr lang="en-US" sz="1200" dirty="0" err="1">
+                <a:solidFill>
+                  <a:schemeClr val="tx1"/>
+                </a:solidFill>
+              </a:rPr>
+              <a:t>api</a:t>
+            </a:r>
+            <a:r>
+              <a:rPr lang="en-US" sz="1200" dirty="0">
+                <a:solidFill>
+                  <a:schemeClr val="tx1"/>
+                </a:solidFill>
+              </a:rPr>
+              <a:t>-gateway</a:t>
+            </a:r>
+            <a:endParaRPr lang="en-IN" sz="1200" dirty="0">
+              <a:solidFill>
+                <a:schemeClr val="tx1"/>
+              </a:solidFill>
+            </a:endParaRPr>
+          </a:p>
+        </p:txBody>
+      </p:sp>
+      <p:sp>
+        <p:nvSpPr>
+          <p:cNvPr id="8" name="Rectangle: Rounded Corners 7">
+            <a:extLst>
+              <a:ext uri="{FF2B5EF4-FFF2-40B4-BE49-F238E27FC236}">
+                <a16:creationId xmlns:a16="http://schemas.microsoft.com/office/drawing/2014/main" id="{C4982DE6-6188-428A-9A08-42B30996F7C0}"/>
               </a:ext>
             </a:extLst>
           </p:cNvPr>
@@ -3460,12 +3493,15 @@
         </p:nvSpPr>
         <p:spPr>
           <a:xfrm>
-            <a:off x="7887730" y="3103604"/>
-            <a:ext cx="2990335" cy="650789"/>
+            <a:off x="3566980" y="2072336"/>
+            <a:ext cx="4374294" cy="650789"/>
           </a:xfrm>
           <a:prstGeom prst="roundRect">
             <a:avLst/>
           </a:prstGeom>
+          <a:solidFill>
+            <a:srgbClr val="00B0F0"/>
+          </a:solidFill>
         </p:spPr>
         <p:style>
           <a:lnRef idx="2">
@@ -3489,19 +3525,27 @@
           <a:p>
             <a:pPr algn="ctr"/>
             <a:r>
-              <a:rPr lang="en-US" dirty="0"/>
-              <a:t>attendance-event-store</a:t>
-            </a:r>
-            <a:endParaRPr lang="en-IN" dirty="0"/>
-          </a:p>
-        </p:txBody>
-      </p:sp>
-      <p:sp>
-        <p:nvSpPr>
-          <p:cNvPr id="7" name="Rectangle: Rounded Corners 6">
-            <a:extLst>
-              <a:ext uri="{FF2B5EF4-FFF2-40B4-BE49-F238E27FC236}">
-                <a16:creationId xmlns:a16="http://schemas.microsoft.com/office/drawing/2014/main" id="{976297CF-38CA-4344-93E4-A8C84D5944B5}"/>
+              <a:rPr lang="en-US" sz="1200" dirty="0">
+                <a:solidFill>
+                  <a:schemeClr val="tx1"/>
+                </a:solidFill>
+              </a:rPr>
+              <a:t>attendance-system-naming-server</a:t>
+            </a:r>
+            <a:endParaRPr lang="en-IN" sz="1200" dirty="0">
+              <a:solidFill>
+                <a:schemeClr val="tx1"/>
+              </a:solidFill>
+            </a:endParaRPr>
+          </a:p>
+        </p:txBody>
+      </p:sp>
+      <p:sp>
+        <p:nvSpPr>
+          <p:cNvPr id="9" name="Rectangle: Rounded Corners 8">
+            <a:extLst>
+              <a:ext uri="{FF2B5EF4-FFF2-40B4-BE49-F238E27FC236}">
+                <a16:creationId xmlns:a16="http://schemas.microsoft.com/office/drawing/2014/main" id="{6287A9FC-9603-41CA-AE41-D278237954AC}"/>
               </a:ext>
             </a:extLst>
           </p:cNvPr>
@@ -3510,8 +3554,8 @@
         </p:nvSpPr>
         <p:spPr>
           <a:xfrm>
-            <a:off x="4250723" y="5626443"/>
-            <a:ext cx="3690551" cy="650789"/>
+            <a:off x="4717491" y="4739325"/>
+            <a:ext cx="2206367" cy="402718"/>
           </a:xfrm>
           <a:prstGeom prst="roundRect">
             <a:avLst/>
@@ -3538,20 +3582,16 @@
           <a:lstStyle/>
           <a:p>
             <a:pPr algn="ctr"/>
-            <a:r>
-              <a:rPr lang="en-US" dirty="0"/>
-              <a:t>attendance-system-naming-server</a:t>
-            </a:r>
-            <a:endParaRPr lang="en-IN" dirty="0"/>
-          </a:p>
-        </p:txBody>
-      </p:sp>
-      <p:sp>
-        <p:nvSpPr>
-          <p:cNvPr id="8" name="Rectangle: Rounded Corners 7">
-            <a:extLst>
-              <a:ext uri="{FF2B5EF4-FFF2-40B4-BE49-F238E27FC236}">
-                <a16:creationId xmlns:a16="http://schemas.microsoft.com/office/drawing/2014/main" id="{C4982DE6-6188-428A-9A08-42B30996F7C0}"/>
+            <a:endParaRPr lang="en-IN" sz="1200" dirty="0"/>
+          </a:p>
+        </p:txBody>
+      </p:sp>
+      <p:sp>
+        <p:nvSpPr>
+          <p:cNvPr id="11" name="Rectangle: Rounded Corners 10">
+            <a:extLst>
+              <a:ext uri="{FF2B5EF4-FFF2-40B4-BE49-F238E27FC236}">
+                <a16:creationId xmlns:a16="http://schemas.microsoft.com/office/drawing/2014/main" id="{91F4C9AB-C2A1-4913-B0F4-758BD6D3D692}"/>
               </a:ext>
             </a:extLst>
           </p:cNvPr>
@@ -3560,12 +3600,43 @@
         </p:nvSpPr>
         <p:spPr>
           <a:xfrm>
-            <a:off x="3908851" y="906159"/>
-            <a:ext cx="4374294" cy="650789"/>
+            <a:off x="8773256" y="2072335"/>
+            <a:ext cx="1776383" cy="650789"/>
           </a:xfrm>
           <a:prstGeom prst="roundRect">
             <a:avLst/>
           </a:prstGeom>
+          <a:gradFill>
+            <a:gsLst>
+              <a:gs pos="0">
+                <a:srgbClr val="92D050"/>
+              </a:gs>
+              <a:gs pos="74000">
+                <a:schemeClr val="accent1">
+                  <a:lumMod val="45000"/>
+                  <a:lumOff val="55000"/>
+                </a:schemeClr>
+              </a:gs>
+              <a:gs pos="83000">
+                <a:schemeClr val="accent1">
+                  <a:lumMod val="45000"/>
+                  <a:lumOff val="55000"/>
+                </a:schemeClr>
+              </a:gs>
+              <a:gs pos="100000">
+                <a:schemeClr val="accent1">
+                  <a:lumMod val="30000"/>
+                  <a:lumOff val="70000"/>
+                </a:schemeClr>
+              </a:gs>
+            </a:gsLst>
+            <a:lin ang="5400000" scaled="1"/>
+          </a:gradFill>
+          <a:ln>
+            <a:solidFill>
+              <a:schemeClr val="tx1"/>
+            </a:solidFill>
+          </a:ln>
         </p:spPr>
         <p:style>
           <a:lnRef idx="2">
@@ -3589,8 +3660,988 @@
           <a:p>
             <a:pPr algn="ctr"/>
             <a:r>
+              <a:rPr lang="en-US" sz="1200" dirty="0">
+                <a:solidFill>
+                  <a:schemeClr val="tx1"/>
+                </a:solidFill>
+              </a:rPr>
+              <a:t>Load balanced Routing</a:t>
+            </a:r>
+            <a:endParaRPr lang="en-IN" sz="1200" dirty="0">
+              <a:solidFill>
+                <a:schemeClr val="tx1"/>
+              </a:solidFill>
+            </a:endParaRPr>
+          </a:p>
+        </p:txBody>
+      </p:sp>
+      <p:sp>
+        <p:nvSpPr>
+          <p:cNvPr id="19" name="Rectangle: Rounded Corners 18">
+            <a:extLst>
+              <a:ext uri="{FF2B5EF4-FFF2-40B4-BE49-F238E27FC236}">
+                <a16:creationId xmlns:a16="http://schemas.microsoft.com/office/drawing/2014/main" id="{E3415755-6C05-444D-A4E7-DCAAC262CAFD}"/>
+              </a:ext>
+            </a:extLst>
+          </p:cNvPr>
+          <p:cNvSpPr/>
+          <p:nvPr/>
+        </p:nvSpPr>
+        <p:spPr>
+          <a:xfrm>
+            <a:off x="7353279" y="4829561"/>
+            <a:ext cx="2091627" cy="381999"/>
+          </a:xfrm>
+          <a:prstGeom prst="roundRect">
+            <a:avLst/>
+          </a:prstGeom>
+        </p:spPr>
+        <p:style>
+          <a:lnRef idx="2">
+            <a:schemeClr val="accent1">
+              <a:shade val="50000"/>
+            </a:schemeClr>
+          </a:lnRef>
+          <a:fillRef idx="1">
+            <a:schemeClr val="accent1"/>
+          </a:fillRef>
+          <a:effectRef idx="0">
+            <a:schemeClr val="accent1"/>
+          </a:effectRef>
+          <a:fontRef idx="minor">
+            <a:schemeClr val="lt1"/>
+          </a:fontRef>
+        </p:style>
+        <p:txBody>
+          <a:bodyPr rtlCol="0" anchor="ctr"/>
+          <a:lstStyle/>
+          <a:p>
+            <a:pPr algn="ctr"/>
+            <a:endParaRPr lang="en-IN" sz="1200" dirty="0"/>
+          </a:p>
+        </p:txBody>
+      </p:sp>
+      <p:sp>
+        <p:nvSpPr>
+          <p:cNvPr id="20" name="Rectangle: Rounded Corners 19">
+            <a:extLst>
+              <a:ext uri="{FF2B5EF4-FFF2-40B4-BE49-F238E27FC236}">
+                <a16:creationId xmlns:a16="http://schemas.microsoft.com/office/drawing/2014/main" id="{98878F93-C6C1-4584-BE8B-31654F8C95E3}"/>
+              </a:ext>
+            </a:extLst>
+          </p:cNvPr>
+          <p:cNvSpPr/>
+          <p:nvPr/>
+        </p:nvSpPr>
+        <p:spPr>
+          <a:xfrm>
+            <a:off x="9527891" y="4124309"/>
+            <a:ext cx="1966225" cy="381999"/>
+          </a:xfrm>
+          <a:prstGeom prst="roundRect">
+            <a:avLst/>
+          </a:prstGeom>
+        </p:spPr>
+        <p:style>
+          <a:lnRef idx="2">
+            <a:schemeClr val="accent1">
+              <a:shade val="50000"/>
+            </a:schemeClr>
+          </a:lnRef>
+          <a:fillRef idx="1">
+            <a:schemeClr val="accent1"/>
+          </a:fillRef>
+          <a:effectRef idx="0">
+            <a:schemeClr val="accent1"/>
+          </a:effectRef>
+          <a:fontRef idx="minor">
+            <a:schemeClr val="lt1"/>
+          </a:fontRef>
+        </p:style>
+        <p:txBody>
+          <a:bodyPr rtlCol="0" anchor="ctr"/>
+          <a:lstStyle/>
+          <a:p>
+            <a:pPr algn="ctr"/>
+            <a:endParaRPr lang="en-IN" sz="1200" dirty="0"/>
+          </a:p>
+        </p:txBody>
+      </p:sp>
+      <p:cxnSp>
+        <p:nvCxnSpPr>
+          <p:cNvPr id="15" name="Straight Arrow Connector 14">
+            <a:extLst>
+              <a:ext uri="{FF2B5EF4-FFF2-40B4-BE49-F238E27FC236}">
+                <a16:creationId xmlns:a16="http://schemas.microsoft.com/office/drawing/2014/main" id="{A9B24B7A-EC2D-48D0-BB47-E1C1D3379963}"/>
+              </a:ext>
+            </a:extLst>
+          </p:cNvPr>
+          <p:cNvCxnSpPr>
+            <a:cxnSpLocks/>
+            <a:stCxn id="6" idx="0"/>
+            <a:endCxn id="8" idx="2"/>
+          </p:cNvCxnSpPr>
+          <p:nvPr/>
+        </p:nvCxnSpPr>
+        <p:spPr>
+          <a:xfrm flipV="1">
+            <a:off x="1227906" y="2723125"/>
+            <a:ext cx="4526221" cy="1401184"/>
+          </a:xfrm>
+          <a:prstGeom prst="straightConnector1">
+            <a:avLst/>
+          </a:prstGeom>
+          <a:ln>
+            <a:headEnd type="triangle"/>
+            <a:tailEnd type="triangle"/>
+          </a:ln>
+        </p:spPr>
+        <p:style>
+          <a:lnRef idx="1">
+            <a:schemeClr val="accent1"/>
+          </a:lnRef>
+          <a:fillRef idx="0">
+            <a:schemeClr val="accent1"/>
+          </a:fillRef>
+          <a:effectRef idx="0">
+            <a:schemeClr val="accent1"/>
+          </a:effectRef>
+          <a:fontRef idx="minor">
+            <a:schemeClr val="tx1"/>
+          </a:fontRef>
+        </p:style>
+      </p:cxnSp>
+      <p:cxnSp>
+        <p:nvCxnSpPr>
+          <p:cNvPr id="21" name="Straight Arrow Connector 20">
+            <a:extLst>
+              <a:ext uri="{FF2B5EF4-FFF2-40B4-BE49-F238E27FC236}">
+                <a16:creationId xmlns:a16="http://schemas.microsoft.com/office/drawing/2014/main" id="{AC701020-5607-4379-BD49-93F9AED0E0FE}"/>
+              </a:ext>
+            </a:extLst>
+          </p:cNvPr>
+          <p:cNvCxnSpPr>
+            <a:cxnSpLocks/>
+            <a:stCxn id="10" idx="0"/>
+            <a:endCxn id="8" idx="2"/>
+          </p:cNvCxnSpPr>
+          <p:nvPr/>
+        </p:nvCxnSpPr>
+        <p:spPr>
+          <a:xfrm flipV="1">
+            <a:off x="3145762" y="2723125"/>
+            <a:ext cx="2608365" cy="2188115"/>
+          </a:xfrm>
+          <a:prstGeom prst="straightConnector1">
+            <a:avLst/>
+          </a:prstGeom>
+          <a:ln>
+            <a:headEnd type="triangle"/>
+            <a:tailEnd type="triangle"/>
+          </a:ln>
+        </p:spPr>
+        <p:style>
+          <a:lnRef idx="1">
+            <a:schemeClr val="accent1"/>
+          </a:lnRef>
+          <a:fillRef idx="0">
+            <a:schemeClr val="accent1"/>
+          </a:fillRef>
+          <a:effectRef idx="0">
+            <a:schemeClr val="accent1"/>
+          </a:effectRef>
+          <a:fontRef idx="minor">
+            <a:schemeClr val="tx1"/>
+          </a:fontRef>
+        </p:style>
+      </p:cxnSp>
+      <p:cxnSp>
+        <p:nvCxnSpPr>
+          <p:cNvPr id="23" name="Straight Arrow Connector 22">
+            <a:extLst>
+              <a:ext uri="{FF2B5EF4-FFF2-40B4-BE49-F238E27FC236}">
+                <a16:creationId xmlns:a16="http://schemas.microsoft.com/office/drawing/2014/main" id="{34291291-D456-40B9-8AEA-BC3F9EAD5A1D}"/>
+              </a:ext>
+            </a:extLst>
+          </p:cNvPr>
+          <p:cNvCxnSpPr>
+            <a:cxnSpLocks/>
+            <a:stCxn id="9" idx="0"/>
+            <a:endCxn id="8" idx="2"/>
+          </p:cNvCxnSpPr>
+          <p:nvPr/>
+        </p:nvCxnSpPr>
+        <p:spPr>
+          <a:xfrm flipH="1" flipV="1">
+            <a:off x="5754127" y="2723125"/>
+            <a:ext cx="66548" cy="2016200"/>
+          </a:xfrm>
+          <a:prstGeom prst="straightConnector1">
+            <a:avLst/>
+          </a:prstGeom>
+          <a:ln>
+            <a:headEnd type="triangle"/>
+            <a:tailEnd type="triangle"/>
+          </a:ln>
+        </p:spPr>
+        <p:style>
+          <a:lnRef idx="1">
+            <a:schemeClr val="accent1"/>
+          </a:lnRef>
+          <a:fillRef idx="0">
+            <a:schemeClr val="accent1"/>
+          </a:fillRef>
+          <a:effectRef idx="0">
+            <a:schemeClr val="accent1"/>
+          </a:effectRef>
+          <a:fontRef idx="minor">
+            <a:schemeClr val="tx1"/>
+          </a:fontRef>
+        </p:style>
+      </p:cxnSp>
+      <p:cxnSp>
+        <p:nvCxnSpPr>
+          <p:cNvPr id="25" name="Straight Arrow Connector 24">
+            <a:extLst>
+              <a:ext uri="{FF2B5EF4-FFF2-40B4-BE49-F238E27FC236}">
+                <a16:creationId xmlns:a16="http://schemas.microsoft.com/office/drawing/2014/main" id="{641CE366-403D-45AF-9BEF-77A639282905}"/>
+              </a:ext>
+            </a:extLst>
+          </p:cNvPr>
+          <p:cNvCxnSpPr>
+            <a:cxnSpLocks/>
+            <a:stCxn id="19" idx="0"/>
+            <a:endCxn id="8" idx="2"/>
+          </p:cNvCxnSpPr>
+          <p:nvPr/>
+        </p:nvCxnSpPr>
+        <p:spPr>
+          <a:xfrm flipH="1" flipV="1">
+            <a:off x="5754127" y="2723125"/>
+            <a:ext cx="2644966" cy="2106436"/>
+          </a:xfrm>
+          <a:prstGeom prst="straightConnector1">
+            <a:avLst/>
+          </a:prstGeom>
+          <a:ln>
+            <a:headEnd type="triangle"/>
+            <a:tailEnd type="triangle"/>
+          </a:ln>
+        </p:spPr>
+        <p:style>
+          <a:lnRef idx="1">
+            <a:schemeClr val="accent1"/>
+          </a:lnRef>
+          <a:fillRef idx="0">
+            <a:schemeClr val="accent1"/>
+          </a:fillRef>
+          <a:effectRef idx="0">
+            <a:schemeClr val="accent1"/>
+          </a:effectRef>
+          <a:fontRef idx="minor">
+            <a:schemeClr val="tx1"/>
+          </a:fontRef>
+        </p:style>
+      </p:cxnSp>
+      <p:cxnSp>
+        <p:nvCxnSpPr>
+          <p:cNvPr id="27" name="Straight Arrow Connector 26">
+            <a:extLst>
+              <a:ext uri="{FF2B5EF4-FFF2-40B4-BE49-F238E27FC236}">
+                <a16:creationId xmlns:a16="http://schemas.microsoft.com/office/drawing/2014/main" id="{A4728B07-27A8-4C8A-8437-353C3B63CB55}"/>
+              </a:ext>
+            </a:extLst>
+          </p:cNvPr>
+          <p:cNvCxnSpPr>
+            <a:cxnSpLocks/>
+            <a:stCxn id="20" idx="0"/>
+            <a:endCxn id="8" idx="2"/>
+          </p:cNvCxnSpPr>
+          <p:nvPr/>
+        </p:nvCxnSpPr>
+        <p:spPr>
+          <a:xfrm flipH="1" flipV="1">
+            <a:off x="5754127" y="2723125"/>
+            <a:ext cx="4756877" cy="1401184"/>
+          </a:xfrm>
+          <a:prstGeom prst="straightConnector1">
+            <a:avLst/>
+          </a:prstGeom>
+          <a:ln>
+            <a:headEnd type="triangle"/>
+            <a:tailEnd type="triangle"/>
+          </a:ln>
+        </p:spPr>
+        <p:style>
+          <a:lnRef idx="1">
+            <a:schemeClr val="accent1"/>
+          </a:lnRef>
+          <a:fillRef idx="0">
+            <a:schemeClr val="accent1"/>
+          </a:fillRef>
+          <a:effectRef idx="0">
+            <a:schemeClr val="accent1"/>
+          </a:effectRef>
+          <a:fontRef idx="minor">
+            <a:schemeClr val="tx1"/>
+          </a:fontRef>
+        </p:style>
+      </p:cxnSp>
+      <p:cxnSp>
+        <p:nvCxnSpPr>
+          <p:cNvPr id="1025" name="Straight Arrow Connector 1024">
+            <a:extLst>
+              <a:ext uri="{FF2B5EF4-FFF2-40B4-BE49-F238E27FC236}">
+                <a16:creationId xmlns:a16="http://schemas.microsoft.com/office/drawing/2014/main" id="{4EC99B43-467B-407D-891D-CEF4D1020565}"/>
+              </a:ext>
+            </a:extLst>
+          </p:cNvPr>
+          <p:cNvCxnSpPr>
+            <a:cxnSpLocks/>
+            <a:stCxn id="8" idx="3"/>
+            <a:endCxn id="11" idx="1"/>
+          </p:cNvCxnSpPr>
+          <p:nvPr/>
+        </p:nvCxnSpPr>
+        <p:spPr>
+          <a:xfrm flipV="1">
+            <a:off x="7941274" y="2397730"/>
+            <a:ext cx="831982" cy="1"/>
+          </a:xfrm>
+          <a:prstGeom prst="straightConnector1">
+            <a:avLst/>
+          </a:prstGeom>
+          <a:ln>
+            <a:headEnd type="triangle"/>
+            <a:tailEnd type="triangle"/>
+          </a:ln>
+        </p:spPr>
+        <p:style>
+          <a:lnRef idx="1">
+            <a:schemeClr val="accent1"/>
+          </a:lnRef>
+          <a:fillRef idx="0">
+            <a:schemeClr val="accent1"/>
+          </a:fillRef>
+          <a:effectRef idx="0">
+            <a:schemeClr val="accent1"/>
+          </a:effectRef>
+          <a:fontRef idx="minor">
+            <a:schemeClr val="tx1"/>
+          </a:fontRef>
+        </p:style>
+      </p:cxnSp>
+      <p:sp>
+        <p:nvSpPr>
+          <p:cNvPr id="39" name="Rectangle: Rounded Corners 38">
+            <a:extLst>
+              <a:ext uri="{FF2B5EF4-FFF2-40B4-BE49-F238E27FC236}">
+                <a16:creationId xmlns:a16="http://schemas.microsoft.com/office/drawing/2014/main" id="{3694A0C9-61F2-4177-809D-37E6DD3644E9}"/>
+              </a:ext>
+            </a:extLst>
+          </p:cNvPr>
+          <p:cNvSpPr/>
+          <p:nvPr/>
+        </p:nvSpPr>
+        <p:spPr>
+          <a:xfrm>
+            <a:off x="280838" y="4225909"/>
+            <a:ext cx="1695193" cy="402718"/>
+          </a:xfrm>
+          <a:prstGeom prst="roundRect">
+            <a:avLst/>
+          </a:prstGeom>
+        </p:spPr>
+        <p:style>
+          <a:lnRef idx="2">
+            <a:schemeClr val="accent1">
+              <a:shade val="50000"/>
+            </a:schemeClr>
+          </a:lnRef>
+          <a:fillRef idx="1">
+            <a:schemeClr val="accent1"/>
+          </a:fillRef>
+          <a:effectRef idx="0">
+            <a:schemeClr val="accent1"/>
+          </a:effectRef>
+          <a:fontRef idx="minor">
+            <a:schemeClr val="lt1"/>
+          </a:fontRef>
+        </p:style>
+        <p:txBody>
+          <a:bodyPr rtlCol="0" anchor="ctr"/>
+          <a:lstStyle/>
+          <a:p>
+            <a:pPr algn="ctr"/>
+            <a:r>
+              <a:rPr lang="en-US" sz="1200" dirty="0"/>
+              <a:t>attendance-event-store</a:t>
+            </a:r>
+            <a:endParaRPr lang="en-IN" sz="1200" dirty="0"/>
+          </a:p>
+        </p:txBody>
+      </p:sp>
+      <p:sp>
+        <p:nvSpPr>
+          <p:cNvPr id="40" name="Rectangle: Rounded Corners 39">
+            <a:extLst>
+              <a:ext uri="{FF2B5EF4-FFF2-40B4-BE49-F238E27FC236}">
+                <a16:creationId xmlns:a16="http://schemas.microsoft.com/office/drawing/2014/main" id="{4D5BC0B8-3AE0-4416-9BA9-61BFC4E730F4}"/>
+              </a:ext>
+            </a:extLst>
+          </p:cNvPr>
+          <p:cNvSpPr/>
+          <p:nvPr/>
+        </p:nvSpPr>
+        <p:spPr>
+          <a:xfrm>
+            <a:off x="166883" y="4347149"/>
+            <a:ext cx="1695193" cy="402718"/>
+          </a:xfrm>
+          <a:prstGeom prst="roundRect">
+            <a:avLst/>
+          </a:prstGeom>
+        </p:spPr>
+        <p:style>
+          <a:lnRef idx="2">
+            <a:schemeClr val="accent1">
+              <a:shade val="50000"/>
+            </a:schemeClr>
+          </a:lnRef>
+          <a:fillRef idx="1">
+            <a:schemeClr val="accent1"/>
+          </a:fillRef>
+          <a:effectRef idx="0">
+            <a:schemeClr val="accent1"/>
+          </a:effectRef>
+          <a:fontRef idx="minor">
+            <a:schemeClr val="lt1"/>
+          </a:fontRef>
+        </p:style>
+        <p:txBody>
+          <a:bodyPr rtlCol="0" anchor="ctr"/>
+          <a:lstStyle/>
+          <a:p>
+            <a:pPr algn="ctr"/>
+            <a:r>
+              <a:rPr lang="en-US" sz="1200" dirty="0"/>
+              <a:t>attendance-event-store</a:t>
+            </a:r>
+            <a:endParaRPr lang="en-IN" sz="1200" dirty="0"/>
+          </a:p>
+        </p:txBody>
+      </p:sp>
+      <p:sp>
+        <p:nvSpPr>
+          <p:cNvPr id="41" name="Rectangle: Rounded Corners 40">
+            <a:extLst>
+              <a:ext uri="{FF2B5EF4-FFF2-40B4-BE49-F238E27FC236}">
+                <a16:creationId xmlns:a16="http://schemas.microsoft.com/office/drawing/2014/main" id="{B44E95AF-0EDB-49B2-83AB-46C24F7FFE9C}"/>
+              </a:ext>
+            </a:extLst>
+          </p:cNvPr>
+          <p:cNvSpPr/>
+          <p:nvPr/>
+        </p:nvSpPr>
+        <p:spPr>
+          <a:xfrm>
+            <a:off x="2151463" y="4749867"/>
+            <a:ext cx="2206368" cy="402718"/>
+          </a:xfrm>
+          <a:prstGeom prst="roundRect">
+            <a:avLst/>
+          </a:prstGeom>
+        </p:spPr>
+        <p:style>
+          <a:lnRef idx="2">
+            <a:schemeClr val="accent1">
+              <a:shade val="50000"/>
+            </a:schemeClr>
+          </a:lnRef>
+          <a:fillRef idx="1">
+            <a:schemeClr val="accent1"/>
+          </a:fillRef>
+          <a:effectRef idx="0">
+            <a:schemeClr val="accent1"/>
+          </a:effectRef>
+          <a:fontRef idx="minor">
+            <a:schemeClr val="lt1"/>
+          </a:fontRef>
+        </p:style>
+        <p:txBody>
+          <a:bodyPr rtlCol="0" anchor="ctr"/>
+          <a:lstStyle/>
+          <a:p>
+            <a:pPr algn="ctr"/>
+            <a:endParaRPr lang="en-IN" sz="1200" dirty="0"/>
+          </a:p>
+        </p:txBody>
+      </p:sp>
+      <p:sp>
+        <p:nvSpPr>
+          <p:cNvPr id="10" name="Rectangle: Rounded Corners 9">
+            <a:extLst>
+              <a:ext uri="{FF2B5EF4-FFF2-40B4-BE49-F238E27FC236}">
+                <a16:creationId xmlns:a16="http://schemas.microsoft.com/office/drawing/2014/main" id="{53B4B39E-CDE0-482C-8BC7-EB065B79E9B6}"/>
+              </a:ext>
+            </a:extLst>
+          </p:cNvPr>
+          <p:cNvSpPr/>
+          <p:nvPr/>
+        </p:nvSpPr>
+        <p:spPr>
+          <a:xfrm>
+            <a:off x="2042578" y="4911240"/>
+            <a:ext cx="2206368" cy="402718"/>
+          </a:xfrm>
+          <a:prstGeom prst="roundRect">
+            <a:avLst/>
+          </a:prstGeom>
+        </p:spPr>
+        <p:style>
+          <a:lnRef idx="2">
+            <a:schemeClr val="accent1">
+              <a:shade val="50000"/>
+            </a:schemeClr>
+          </a:lnRef>
+          <a:fillRef idx="1">
+            <a:schemeClr val="accent1"/>
+          </a:fillRef>
+          <a:effectRef idx="0">
+            <a:schemeClr val="accent1"/>
+          </a:effectRef>
+          <a:fontRef idx="minor">
+            <a:schemeClr val="lt1"/>
+          </a:fontRef>
+        </p:style>
+        <p:txBody>
+          <a:bodyPr rtlCol="0" anchor="ctr"/>
+          <a:lstStyle/>
+          <a:p>
+            <a:pPr algn="ctr"/>
+            <a:endParaRPr lang="en-IN" sz="1200" dirty="0"/>
+          </a:p>
+        </p:txBody>
+      </p:sp>
+      <p:sp>
+        <p:nvSpPr>
+          <p:cNvPr id="42" name="Rectangle: Rounded Corners 41">
+            <a:extLst>
+              <a:ext uri="{FF2B5EF4-FFF2-40B4-BE49-F238E27FC236}">
+                <a16:creationId xmlns:a16="http://schemas.microsoft.com/office/drawing/2014/main" id="{45312AF9-B662-40E0-A7E6-06ED70715435}"/>
+              </a:ext>
+            </a:extLst>
+          </p:cNvPr>
+          <p:cNvSpPr/>
+          <p:nvPr/>
+        </p:nvSpPr>
+        <p:spPr>
+          <a:xfrm>
+            <a:off x="1939860" y="5072613"/>
+            <a:ext cx="2206368" cy="402718"/>
+          </a:xfrm>
+          <a:prstGeom prst="roundRect">
+            <a:avLst/>
+          </a:prstGeom>
+        </p:spPr>
+        <p:style>
+          <a:lnRef idx="2">
+            <a:schemeClr val="accent1">
+              <a:shade val="50000"/>
+            </a:schemeClr>
+          </a:lnRef>
+          <a:fillRef idx="1">
+            <a:schemeClr val="accent1"/>
+          </a:fillRef>
+          <a:effectRef idx="0">
+            <a:schemeClr val="accent1"/>
+          </a:effectRef>
+          <a:fontRef idx="minor">
+            <a:schemeClr val="lt1"/>
+          </a:fontRef>
+        </p:style>
+        <p:txBody>
+          <a:bodyPr rtlCol="0" anchor="ctr"/>
+          <a:lstStyle/>
+          <a:p>
+            <a:pPr algn="ctr"/>
+            <a:r>
+              <a:rPr lang="en-US" sz="1200" dirty="0"/>
+              <a:t>attendance-consumer-service</a:t>
+            </a:r>
+            <a:endParaRPr lang="en-IN" sz="1200" dirty="0"/>
+          </a:p>
+        </p:txBody>
+      </p:sp>
+      <p:sp>
+        <p:nvSpPr>
+          <p:cNvPr id="54" name="Rectangle: Rounded Corners 53">
+            <a:extLst>
+              <a:ext uri="{FF2B5EF4-FFF2-40B4-BE49-F238E27FC236}">
+                <a16:creationId xmlns:a16="http://schemas.microsoft.com/office/drawing/2014/main" id="{F6AD7FB8-804A-4B49-B683-53A1CC37E4BC}"/>
+              </a:ext>
+            </a:extLst>
+          </p:cNvPr>
+          <p:cNvSpPr/>
+          <p:nvPr/>
+        </p:nvSpPr>
+        <p:spPr>
+          <a:xfrm>
+            <a:off x="4603536" y="4885664"/>
+            <a:ext cx="2206367" cy="402718"/>
+          </a:xfrm>
+          <a:prstGeom prst="roundRect">
+            <a:avLst/>
+          </a:prstGeom>
+        </p:spPr>
+        <p:style>
+          <a:lnRef idx="2">
+            <a:schemeClr val="accent1">
+              <a:shade val="50000"/>
+            </a:schemeClr>
+          </a:lnRef>
+          <a:fillRef idx="1">
+            <a:schemeClr val="accent1"/>
+          </a:fillRef>
+          <a:effectRef idx="0">
+            <a:schemeClr val="accent1"/>
+          </a:effectRef>
+          <a:fontRef idx="minor">
+            <a:schemeClr val="lt1"/>
+          </a:fontRef>
+        </p:style>
+        <p:txBody>
+          <a:bodyPr rtlCol="0" anchor="ctr"/>
+          <a:lstStyle/>
+          <a:p>
+            <a:pPr algn="ctr"/>
+            <a:endParaRPr lang="en-IN" sz="1200" dirty="0"/>
+          </a:p>
+        </p:txBody>
+      </p:sp>
+      <p:sp>
+        <p:nvSpPr>
+          <p:cNvPr id="55" name="Rectangle: Rounded Corners 54">
+            <a:extLst>
+              <a:ext uri="{FF2B5EF4-FFF2-40B4-BE49-F238E27FC236}">
+                <a16:creationId xmlns:a16="http://schemas.microsoft.com/office/drawing/2014/main" id="{2ED1D75B-A890-47CB-9A9F-A42221BB2937}"/>
+              </a:ext>
+            </a:extLst>
+          </p:cNvPr>
+          <p:cNvSpPr/>
+          <p:nvPr/>
+        </p:nvSpPr>
+        <p:spPr>
+          <a:xfrm>
+            <a:off x="4500818" y="5047248"/>
+            <a:ext cx="2206367" cy="402718"/>
+          </a:xfrm>
+          <a:prstGeom prst="roundRect">
+            <a:avLst/>
+          </a:prstGeom>
+        </p:spPr>
+        <p:style>
+          <a:lnRef idx="2">
+            <a:schemeClr val="accent1">
+              <a:shade val="50000"/>
+            </a:schemeClr>
+          </a:lnRef>
+          <a:fillRef idx="1">
+            <a:schemeClr val="accent1"/>
+          </a:fillRef>
+          <a:effectRef idx="0">
+            <a:schemeClr val="accent1"/>
+          </a:effectRef>
+          <a:fontRef idx="minor">
+            <a:schemeClr val="lt1"/>
+          </a:fontRef>
+        </p:style>
+        <p:txBody>
+          <a:bodyPr rtlCol="0" anchor="ctr"/>
+          <a:lstStyle/>
+          <a:p>
+            <a:pPr algn="ctr"/>
+            <a:r>
+              <a:rPr lang="en-US" sz="1200" dirty="0"/>
+              <a:t>attendance-calculation-service</a:t>
+            </a:r>
+            <a:endParaRPr lang="en-IN" sz="1200" dirty="0"/>
+          </a:p>
+        </p:txBody>
+      </p:sp>
+      <p:sp>
+        <p:nvSpPr>
+          <p:cNvPr id="59" name="Rectangle: Rounded Corners 58">
+            <a:extLst>
+              <a:ext uri="{FF2B5EF4-FFF2-40B4-BE49-F238E27FC236}">
+                <a16:creationId xmlns:a16="http://schemas.microsoft.com/office/drawing/2014/main" id="{D5E0A43B-AC5B-4468-AE75-0BF149139388}"/>
+              </a:ext>
+            </a:extLst>
+          </p:cNvPr>
+          <p:cNvSpPr/>
+          <p:nvPr/>
+        </p:nvSpPr>
+        <p:spPr>
+          <a:xfrm>
+            <a:off x="7505679" y="4981961"/>
+            <a:ext cx="2091627" cy="381999"/>
+          </a:xfrm>
+          <a:prstGeom prst="roundRect">
+            <a:avLst/>
+          </a:prstGeom>
+        </p:spPr>
+        <p:style>
+          <a:lnRef idx="2">
+            <a:schemeClr val="accent1">
+              <a:shade val="50000"/>
+            </a:schemeClr>
+          </a:lnRef>
+          <a:fillRef idx="1">
+            <a:schemeClr val="accent1"/>
+          </a:fillRef>
+          <a:effectRef idx="0">
+            <a:schemeClr val="accent1"/>
+          </a:effectRef>
+          <a:fontRef idx="minor">
+            <a:schemeClr val="lt1"/>
+          </a:fontRef>
+        </p:style>
+        <p:txBody>
+          <a:bodyPr rtlCol="0" anchor="ctr"/>
+          <a:lstStyle/>
+          <a:p>
+            <a:pPr algn="ctr"/>
+            <a:endParaRPr lang="en-IN" sz="1200" dirty="0"/>
+          </a:p>
+        </p:txBody>
+      </p:sp>
+      <p:sp>
+        <p:nvSpPr>
+          <p:cNvPr id="60" name="Rectangle: Rounded Corners 59">
+            <a:extLst>
+              <a:ext uri="{FF2B5EF4-FFF2-40B4-BE49-F238E27FC236}">
+                <a16:creationId xmlns:a16="http://schemas.microsoft.com/office/drawing/2014/main" id="{7B60479B-A3D1-436F-96AE-EAEFBE585B8A}"/>
+              </a:ext>
+            </a:extLst>
+          </p:cNvPr>
+          <p:cNvSpPr/>
+          <p:nvPr/>
+        </p:nvSpPr>
+        <p:spPr>
+          <a:xfrm>
+            <a:off x="7658079" y="5134361"/>
+            <a:ext cx="2091627" cy="381999"/>
+          </a:xfrm>
+          <a:prstGeom prst="roundRect">
+            <a:avLst/>
+          </a:prstGeom>
+        </p:spPr>
+        <p:style>
+          <a:lnRef idx="2">
+            <a:schemeClr val="accent1">
+              <a:shade val="50000"/>
+            </a:schemeClr>
+          </a:lnRef>
+          <a:fillRef idx="1">
+            <a:schemeClr val="accent1"/>
+          </a:fillRef>
+          <a:effectRef idx="0">
+            <a:schemeClr val="accent1"/>
+          </a:effectRef>
+          <a:fontRef idx="minor">
+            <a:schemeClr val="lt1"/>
+          </a:fontRef>
+        </p:style>
+        <p:txBody>
+          <a:bodyPr rtlCol="0" anchor="ctr"/>
+          <a:lstStyle/>
+          <a:p>
+            <a:pPr algn="ctr"/>
+            <a:r>
+              <a:rPr lang="en-US" sz="1200" dirty="0"/>
+              <a:t>attendance-service-</a:t>
+            </a:r>
+            <a:r>
+              <a:rPr lang="en-US" sz="1200" dirty="0" err="1"/>
+              <a:t>graphql</a:t>
+            </a:r>
+            <a:endParaRPr lang="en-IN" sz="1200" dirty="0"/>
+          </a:p>
+        </p:txBody>
+      </p:sp>
+      <p:sp>
+        <p:nvSpPr>
+          <p:cNvPr id="61" name="Rectangle: Rounded Corners 60">
+            <a:extLst>
+              <a:ext uri="{FF2B5EF4-FFF2-40B4-BE49-F238E27FC236}">
+                <a16:creationId xmlns:a16="http://schemas.microsoft.com/office/drawing/2014/main" id="{14FB7948-B31C-44D3-B837-65735BD9BDC3}"/>
+              </a:ext>
+            </a:extLst>
+          </p:cNvPr>
+          <p:cNvSpPr/>
+          <p:nvPr/>
+        </p:nvSpPr>
+        <p:spPr>
+          <a:xfrm>
+            <a:off x="9680291" y="4276709"/>
+            <a:ext cx="1966225" cy="381999"/>
+          </a:xfrm>
+          <a:prstGeom prst="roundRect">
+            <a:avLst/>
+          </a:prstGeom>
+        </p:spPr>
+        <p:style>
+          <a:lnRef idx="2">
+            <a:schemeClr val="accent1">
+              <a:shade val="50000"/>
+            </a:schemeClr>
+          </a:lnRef>
+          <a:fillRef idx="1">
+            <a:schemeClr val="accent1"/>
+          </a:fillRef>
+          <a:effectRef idx="0">
+            <a:schemeClr val="accent1"/>
+          </a:effectRef>
+          <a:fontRef idx="minor">
+            <a:schemeClr val="lt1"/>
+          </a:fontRef>
+        </p:style>
+        <p:txBody>
+          <a:bodyPr rtlCol="0" anchor="ctr"/>
+          <a:lstStyle/>
+          <a:p>
+            <a:pPr algn="ctr"/>
+            <a:endParaRPr lang="en-IN" sz="1200" dirty="0"/>
+          </a:p>
+        </p:txBody>
+      </p:sp>
+      <p:sp>
+        <p:nvSpPr>
+          <p:cNvPr id="62" name="Rectangle: Rounded Corners 61">
+            <a:extLst>
+              <a:ext uri="{FF2B5EF4-FFF2-40B4-BE49-F238E27FC236}">
+                <a16:creationId xmlns:a16="http://schemas.microsoft.com/office/drawing/2014/main" id="{15075905-FA46-4A12-A9A1-5972F6654B86}"/>
+              </a:ext>
+            </a:extLst>
+          </p:cNvPr>
+          <p:cNvSpPr/>
+          <p:nvPr/>
+        </p:nvSpPr>
+        <p:spPr>
+          <a:xfrm>
+            <a:off x="9832691" y="4429109"/>
+            <a:ext cx="1966225" cy="381999"/>
+          </a:xfrm>
+          <a:prstGeom prst="roundRect">
+            <a:avLst/>
+          </a:prstGeom>
+        </p:spPr>
+        <p:style>
+          <a:lnRef idx="2">
+            <a:schemeClr val="accent1">
+              <a:shade val="50000"/>
+            </a:schemeClr>
+          </a:lnRef>
+          <a:fillRef idx="1">
+            <a:schemeClr val="accent1"/>
+          </a:fillRef>
+          <a:effectRef idx="0">
+            <a:schemeClr val="accent1"/>
+          </a:effectRef>
+          <a:fontRef idx="minor">
+            <a:schemeClr val="lt1"/>
+          </a:fontRef>
+        </p:style>
+        <p:txBody>
+          <a:bodyPr rtlCol="0" anchor="ctr"/>
+          <a:lstStyle/>
+          <a:p>
+            <a:pPr algn="ctr"/>
+            <a:r>
+              <a:rPr lang="en-US" sz="1200" dirty="0"/>
+              <a:t>attendance-system-service</a:t>
+            </a:r>
+            <a:endParaRPr lang="en-IN" sz="1200" dirty="0"/>
+          </a:p>
+        </p:txBody>
+      </p:sp>
+      <p:cxnSp>
+        <p:nvCxnSpPr>
+          <p:cNvPr id="1046" name="Straight Arrow Connector 1045">
+            <a:extLst>
+              <a:ext uri="{FF2B5EF4-FFF2-40B4-BE49-F238E27FC236}">
+                <a16:creationId xmlns:a16="http://schemas.microsoft.com/office/drawing/2014/main" id="{6DCB073A-07B3-448F-895A-4A050EA2B794}"/>
+              </a:ext>
+            </a:extLst>
+          </p:cNvPr>
+          <p:cNvCxnSpPr>
+            <a:stCxn id="7" idx="2"/>
+            <a:endCxn id="8" idx="0"/>
+          </p:cNvCxnSpPr>
+          <p:nvPr/>
+        </p:nvCxnSpPr>
+        <p:spPr>
+          <a:xfrm>
+            <a:off x="5747847" y="879043"/>
+            <a:ext cx="6280" cy="1193293"/>
+          </a:xfrm>
+          <a:prstGeom prst="straightConnector1">
+            <a:avLst/>
+          </a:prstGeom>
+          <a:ln w="19050">
+            <a:solidFill>
+              <a:srgbClr val="00B050"/>
+            </a:solidFill>
+            <a:headEnd type="triangle"/>
+            <a:tailEnd type="triangle"/>
+          </a:ln>
+        </p:spPr>
+        <p:style>
+          <a:lnRef idx="1">
+            <a:schemeClr val="accent1"/>
+          </a:lnRef>
+          <a:fillRef idx="0">
+            <a:schemeClr val="accent1"/>
+          </a:fillRef>
+          <a:effectRef idx="0">
+            <a:schemeClr val="accent1"/>
+          </a:effectRef>
+          <a:fontRef idx="minor">
+            <a:schemeClr val="tx1"/>
+          </a:fontRef>
+        </p:style>
+      </p:cxnSp>
+      <p:sp>
+        <p:nvSpPr>
+          <p:cNvPr id="1049" name="TextBox 1048">
+            <a:extLst>
+              <a:ext uri="{FF2B5EF4-FFF2-40B4-BE49-F238E27FC236}">
+                <a16:creationId xmlns:a16="http://schemas.microsoft.com/office/drawing/2014/main" id="{184EC98E-039B-4666-B336-25D95B1555CD}"/>
+              </a:ext>
+            </a:extLst>
+          </p:cNvPr>
+          <p:cNvSpPr txBox="1"/>
+          <p:nvPr/>
+        </p:nvSpPr>
+        <p:spPr>
+          <a:xfrm>
+            <a:off x="3285903" y="6227021"/>
+            <a:ext cx="5620193" cy="369332"/>
+          </a:xfrm>
+          <a:prstGeom prst="rect">
+            <a:avLst/>
+          </a:prstGeom>
+          <a:noFill/>
+        </p:spPr>
+        <p:txBody>
+          <a:bodyPr wrap="none" rtlCol="0">
+            <a:spAutoFit/>
+          </a:bodyPr>
+          <a:lstStyle/>
+          <a:p>
+            <a:r>
               <a:rPr lang="en-US" dirty="0"/>
-              <a:t>attendance-system-cloud-config-server</a:t>
+              <a:t>API Gateway, Load Balancing, Service Registry &amp; Discovery</a:t>
             </a:r>
             <a:endParaRPr lang="en-IN" dirty="0"/>
           </a:p>
@@ -3600,6 +4651,2145 @@
     <p:extLst>
       <p:ext uri="{BB962C8B-B14F-4D97-AF65-F5344CB8AC3E}">
         <p14:creationId xmlns:p14="http://schemas.microsoft.com/office/powerpoint/2010/main" val="3106963400"/>
+      </p:ext>
+    </p:extLst>
+  </p:cSld>
+  <p:clrMapOvr>
+    <a:masterClrMapping/>
+  </p:clrMapOvr>
+</p:sld>
+</file>
+
+<file path=ppt/slides/slide2.xml><?xml version="1.0" encoding="utf-8"?>
+<p:sld xmlns:a="http://schemas.openxmlformats.org/drawingml/2006/main" xmlns:r="http://schemas.openxmlformats.org/officeDocument/2006/relationships" xmlns:p="http://schemas.openxmlformats.org/presentationml/2006/main">
+  <p:cSld>
+    <p:spTree>
+      <p:nvGrpSpPr>
+        <p:cNvPr id="1" name=""/>
+        <p:cNvGrpSpPr/>
+        <p:nvPr/>
+      </p:nvGrpSpPr>
+      <p:grpSpPr>
+        <a:xfrm>
+          <a:off x="0" y="0"/>
+          <a:ext cx="0" cy="0"/>
+          <a:chOff x="0" y="0"/>
+          <a:chExt cx="0" cy="0"/>
+        </a:xfrm>
+      </p:grpSpPr>
+      <p:sp>
+        <p:nvSpPr>
+          <p:cNvPr id="6" name="Rectangle: Rounded Corners 5">
+            <a:extLst>
+              <a:ext uri="{FF2B5EF4-FFF2-40B4-BE49-F238E27FC236}">
+                <a16:creationId xmlns:a16="http://schemas.microsoft.com/office/drawing/2014/main" id="{A69BECE9-7BDF-476F-A414-9E046299323D}"/>
+              </a:ext>
+            </a:extLst>
+          </p:cNvPr>
+          <p:cNvSpPr/>
+          <p:nvPr/>
+        </p:nvSpPr>
+        <p:spPr>
+          <a:xfrm>
+            <a:off x="235207" y="5055976"/>
+            <a:ext cx="1695193" cy="402718"/>
+          </a:xfrm>
+          <a:prstGeom prst="roundRect">
+            <a:avLst/>
+          </a:prstGeom>
+          <a:solidFill>
+            <a:schemeClr val="accent1">
+              <a:lumMod val="60000"/>
+              <a:lumOff val="40000"/>
+            </a:schemeClr>
+          </a:solidFill>
+        </p:spPr>
+        <p:style>
+          <a:lnRef idx="2">
+            <a:schemeClr val="accent1">
+              <a:shade val="50000"/>
+            </a:schemeClr>
+          </a:lnRef>
+          <a:fillRef idx="1">
+            <a:schemeClr val="accent1"/>
+          </a:fillRef>
+          <a:effectRef idx="0">
+            <a:schemeClr val="accent1"/>
+          </a:effectRef>
+          <a:fontRef idx="minor">
+            <a:schemeClr val="lt1"/>
+          </a:fontRef>
+        </p:style>
+        <p:txBody>
+          <a:bodyPr rtlCol="0" anchor="ctr"/>
+          <a:lstStyle/>
+          <a:p>
+            <a:pPr algn="ctr"/>
+            <a:r>
+              <a:rPr lang="en-US" sz="1200" dirty="0"/>
+              <a:t>attendance-event-store</a:t>
+            </a:r>
+            <a:endParaRPr lang="en-IN" sz="1200" dirty="0"/>
+          </a:p>
+        </p:txBody>
+      </p:sp>
+      <p:sp>
+        <p:nvSpPr>
+          <p:cNvPr id="8" name="Rectangle: Rounded Corners 7">
+            <a:extLst>
+              <a:ext uri="{FF2B5EF4-FFF2-40B4-BE49-F238E27FC236}">
+                <a16:creationId xmlns:a16="http://schemas.microsoft.com/office/drawing/2014/main" id="{C4982DE6-6188-428A-9A08-42B30996F7C0}"/>
+              </a:ext>
+            </a:extLst>
+          </p:cNvPr>
+          <p:cNvSpPr/>
+          <p:nvPr/>
+        </p:nvSpPr>
+        <p:spPr>
+          <a:xfrm>
+            <a:off x="3566980" y="2072336"/>
+            <a:ext cx="4374294" cy="650789"/>
+          </a:xfrm>
+          <a:prstGeom prst="roundRect">
+            <a:avLst/>
+          </a:prstGeom>
+          <a:solidFill>
+            <a:srgbClr val="00B0F0"/>
+          </a:solidFill>
+        </p:spPr>
+        <p:style>
+          <a:lnRef idx="2">
+            <a:schemeClr val="accent1">
+              <a:shade val="50000"/>
+            </a:schemeClr>
+          </a:lnRef>
+          <a:fillRef idx="1">
+            <a:schemeClr val="accent1"/>
+          </a:fillRef>
+          <a:effectRef idx="0">
+            <a:schemeClr val="accent1"/>
+          </a:effectRef>
+          <a:fontRef idx="minor">
+            <a:schemeClr val="lt1"/>
+          </a:fontRef>
+        </p:style>
+        <p:txBody>
+          <a:bodyPr rtlCol="0" anchor="ctr"/>
+          <a:lstStyle/>
+          <a:p>
+            <a:pPr algn="ctr"/>
+            <a:r>
+              <a:rPr lang="en-US" sz="1200" dirty="0"/>
+              <a:t>attendance-system-cloud-config-server</a:t>
+            </a:r>
+            <a:endParaRPr lang="en-IN" sz="1200" dirty="0"/>
+          </a:p>
+        </p:txBody>
+      </p:sp>
+      <p:sp>
+        <p:nvSpPr>
+          <p:cNvPr id="9" name="Rectangle: Rounded Corners 8">
+            <a:extLst>
+              <a:ext uri="{FF2B5EF4-FFF2-40B4-BE49-F238E27FC236}">
+                <a16:creationId xmlns:a16="http://schemas.microsoft.com/office/drawing/2014/main" id="{6287A9FC-9603-41CA-AE41-D278237954AC}"/>
+              </a:ext>
+            </a:extLst>
+          </p:cNvPr>
+          <p:cNvSpPr/>
+          <p:nvPr/>
+        </p:nvSpPr>
+        <p:spPr>
+          <a:xfrm>
+            <a:off x="4364678" y="5055975"/>
+            <a:ext cx="2206367" cy="402718"/>
+          </a:xfrm>
+          <a:prstGeom prst="roundRect">
+            <a:avLst/>
+          </a:prstGeom>
+          <a:solidFill>
+            <a:schemeClr val="accent1">
+              <a:lumMod val="60000"/>
+              <a:lumOff val="40000"/>
+            </a:schemeClr>
+          </a:solidFill>
+        </p:spPr>
+        <p:style>
+          <a:lnRef idx="2">
+            <a:schemeClr val="accent1">
+              <a:shade val="50000"/>
+            </a:schemeClr>
+          </a:lnRef>
+          <a:fillRef idx="1">
+            <a:schemeClr val="accent1"/>
+          </a:fillRef>
+          <a:effectRef idx="0">
+            <a:schemeClr val="accent1"/>
+          </a:effectRef>
+          <a:fontRef idx="minor">
+            <a:schemeClr val="lt1"/>
+          </a:fontRef>
+        </p:style>
+        <p:txBody>
+          <a:bodyPr rtlCol="0" anchor="ctr"/>
+          <a:lstStyle/>
+          <a:p>
+            <a:pPr algn="ctr"/>
+            <a:r>
+              <a:rPr lang="en-US" sz="1200" dirty="0"/>
+              <a:t>attendance-calculation-service</a:t>
+            </a:r>
+            <a:endParaRPr lang="en-IN" sz="1200" dirty="0"/>
+          </a:p>
+        </p:txBody>
+      </p:sp>
+      <p:sp>
+        <p:nvSpPr>
+          <p:cNvPr id="10" name="Rectangle: Rounded Corners 9">
+            <a:extLst>
+              <a:ext uri="{FF2B5EF4-FFF2-40B4-BE49-F238E27FC236}">
+                <a16:creationId xmlns:a16="http://schemas.microsoft.com/office/drawing/2014/main" id="{53B4B39E-CDE0-482C-8BC7-EB065B79E9B6}"/>
+              </a:ext>
+            </a:extLst>
+          </p:cNvPr>
+          <p:cNvSpPr/>
+          <p:nvPr/>
+        </p:nvSpPr>
+        <p:spPr>
+          <a:xfrm>
+            <a:off x="2044355" y="5055975"/>
+            <a:ext cx="2206368" cy="402718"/>
+          </a:xfrm>
+          <a:prstGeom prst="roundRect">
+            <a:avLst/>
+          </a:prstGeom>
+          <a:solidFill>
+            <a:schemeClr val="accent1">
+              <a:lumMod val="60000"/>
+              <a:lumOff val="40000"/>
+            </a:schemeClr>
+          </a:solidFill>
+        </p:spPr>
+        <p:style>
+          <a:lnRef idx="2">
+            <a:schemeClr val="accent1">
+              <a:shade val="50000"/>
+            </a:schemeClr>
+          </a:lnRef>
+          <a:fillRef idx="1">
+            <a:schemeClr val="accent1"/>
+          </a:fillRef>
+          <a:effectRef idx="0">
+            <a:schemeClr val="accent1"/>
+          </a:effectRef>
+          <a:fontRef idx="minor">
+            <a:schemeClr val="lt1"/>
+          </a:fontRef>
+        </p:style>
+        <p:txBody>
+          <a:bodyPr rtlCol="0" anchor="ctr"/>
+          <a:lstStyle/>
+          <a:p>
+            <a:pPr algn="ctr"/>
+            <a:r>
+              <a:rPr lang="en-US" sz="1200" dirty="0"/>
+              <a:t>attendance-consumer-service</a:t>
+            </a:r>
+            <a:endParaRPr lang="en-IN" sz="1200" dirty="0"/>
+          </a:p>
+        </p:txBody>
+      </p:sp>
+      <p:sp>
+        <p:nvSpPr>
+          <p:cNvPr id="11" name="Rectangle: Rounded Corners 10">
+            <a:extLst>
+              <a:ext uri="{FF2B5EF4-FFF2-40B4-BE49-F238E27FC236}">
+                <a16:creationId xmlns:a16="http://schemas.microsoft.com/office/drawing/2014/main" id="{91F4C9AB-C2A1-4913-B0F4-758BD6D3D692}"/>
+              </a:ext>
+            </a:extLst>
+          </p:cNvPr>
+          <p:cNvSpPr/>
+          <p:nvPr/>
+        </p:nvSpPr>
+        <p:spPr>
+          <a:xfrm>
+            <a:off x="8773256" y="2072335"/>
+            <a:ext cx="1100439" cy="650789"/>
+          </a:xfrm>
+          <a:prstGeom prst="roundRect">
+            <a:avLst/>
+          </a:prstGeom>
+          <a:solidFill>
+            <a:srgbClr val="00B0F0"/>
+          </a:solidFill>
+        </p:spPr>
+        <p:style>
+          <a:lnRef idx="2">
+            <a:schemeClr val="accent1">
+              <a:shade val="50000"/>
+            </a:schemeClr>
+          </a:lnRef>
+          <a:fillRef idx="1">
+            <a:schemeClr val="accent1"/>
+          </a:fillRef>
+          <a:effectRef idx="0">
+            <a:schemeClr val="accent1"/>
+          </a:effectRef>
+          <a:fontRef idx="minor">
+            <a:schemeClr val="lt1"/>
+          </a:fontRef>
+        </p:style>
+        <p:txBody>
+          <a:bodyPr rtlCol="0" anchor="ctr"/>
+          <a:lstStyle/>
+          <a:p>
+            <a:pPr algn="ctr"/>
+            <a:r>
+              <a:rPr lang="en-US" sz="1200" dirty="0"/>
+              <a:t>git-local-repo</a:t>
+            </a:r>
+            <a:endParaRPr lang="en-IN" sz="1200" dirty="0"/>
+          </a:p>
+        </p:txBody>
+      </p:sp>
+      <p:sp>
+        <p:nvSpPr>
+          <p:cNvPr id="19" name="Rectangle: Rounded Corners 18">
+            <a:extLst>
+              <a:ext uri="{FF2B5EF4-FFF2-40B4-BE49-F238E27FC236}">
+                <a16:creationId xmlns:a16="http://schemas.microsoft.com/office/drawing/2014/main" id="{E3415755-6C05-444D-A4E7-DCAAC262CAFD}"/>
+              </a:ext>
+            </a:extLst>
+          </p:cNvPr>
+          <p:cNvSpPr/>
+          <p:nvPr/>
+        </p:nvSpPr>
+        <p:spPr>
+          <a:xfrm>
+            <a:off x="6685000" y="5055975"/>
+            <a:ext cx="2091627" cy="381999"/>
+          </a:xfrm>
+          <a:prstGeom prst="roundRect">
+            <a:avLst/>
+          </a:prstGeom>
+          <a:solidFill>
+            <a:schemeClr val="accent1">
+              <a:lumMod val="60000"/>
+              <a:lumOff val="40000"/>
+            </a:schemeClr>
+          </a:solidFill>
+        </p:spPr>
+        <p:style>
+          <a:lnRef idx="2">
+            <a:schemeClr val="accent1">
+              <a:shade val="50000"/>
+            </a:schemeClr>
+          </a:lnRef>
+          <a:fillRef idx="1">
+            <a:schemeClr val="accent1"/>
+          </a:fillRef>
+          <a:effectRef idx="0">
+            <a:schemeClr val="accent1"/>
+          </a:effectRef>
+          <a:fontRef idx="minor">
+            <a:schemeClr val="lt1"/>
+          </a:fontRef>
+        </p:style>
+        <p:txBody>
+          <a:bodyPr rtlCol="0" anchor="ctr"/>
+          <a:lstStyle/>
+          <a:p>
+            <a:pPr algn="ctr"/>
+            <a:r>
+              <a:rPr lang="en-US" sz="1200" dirty="0"/>
+              <a:t>attendance-service-</a:t>
+            </a:r>
+            <a:r>
+              <a:rPr lang="en-US" sz="1200" dirty="0" err="1"/>
+              <a:t>graphql</a:t>
+            </a:r>
+            <a:endParaRPr lang="en-IN" sz="1200" dirty="0"/>
+          </a:p>
+        </p:txBody>
+      </p:sp>
+      <p:sp>
+        <p:nvSpPr>
+          <p:cNvPr id="20" name="Rectangle: Rounded Corners 19">
+            <a:extLst>
+              <a:ext uri="{FF2B5EF4-FFF2-40B4-BE49-F238E27FC236}">
+                <a16:creationId xmlns:a16="http://schemas.microsoft.com/office/drawing/2014/main" id="{98878F93-C6C1-4584-BE8B-31654F8C95E3}"/>
+              </a:ext>
+            </a:extLst>
+          </p:cNvPr>
+          <p:cNvSpPr/>
+          <p:nvPr/>
+        </p:nvSpPr>
+        <p:spPr>
+          <a:xfrm>
+            <a:off x="8890582" y="5055974"/>
+            <a:ext cx="1966225" cy="381999"/>
+          </a:xfrm>
+          <a:prstGeom prst="roundRect">
+            <a:avLst/>
+          </a:prstGeom>
+          <a:solidFill>
+            <a:schemeClr val="accent1">
+              <a:lumMod val="60000"/>
+              <a:lumOff val="40000"/>
+            </a:schemeClr>
+          </a:solidFill>
+        </p:spPr>
+        <p:style>
+          <a:lnRef idx="2">
+            <a:schemeClr val="accent1">
+              <a:shade val="50000"/>
+            </a:schemeClr>
+          </a:lnRef>
+          <a:fillRef idx="1">
+            <a:schemeClr val="accent1"/>
+          </a:fillRef>
+          <a:effectRef idx="0">
+            <a:schemeClr val="accent1"/>
+          </a:effectRef>
+          <a:fontRef idx="minor">
+            <a:schemeClr val="lt1"/>
+          </a:fontRef>
+        </p:style>
+        <p:txBody>
+          <a:bodyPr rtlCol="0" anchor="ctr"/>
+          <a:lstStyle/>
+          <a:p>
+            <a:pPr algn="ctr"/>
+            <a:r>
+              <a:rPr lang="en-US" sz="1200" dirty="0"/>
+              <a:t>attendance-system-service</a:t>
+            </a:r>
+            <a:endParaRPr lang="en-IN" sz="1200" dirty="0"/>
+          </a:p>
+        </p:txBody>
+      </p:sp>
+      <p:cxnSp>
+        <p:nvCxnSpPr>
+          <p:cNvPr id="15" name="Straight Arrow Connector 14">
+            <a:extLst>
+              <a:ext uri="{FF2B5EF4-FFF2-40B4-BE49-F238E27FC236}">
+                <a16:creationId xmlns:a16="http://schemas.microsoft.com/office/drawing/2014/main" id="{A9B24B7A-EC2D-48D0-BB47-E1C1D3379963}"/>
+              </a:ext>
+            </a:extLst>
+          </p:cNvPr>
+          <p:cNvCxnSpPr>
+            <a:cxnSpLocks/>
+            <a:stCxn id="6" idx="0"/>
+          </p:cNvCxnSpPr>
+          <p:nvPr/>
+        </p:nvCxnSpPr>
+        <p:spPr>
+          <a:xfrm flipV="1">
+            <a:off x="1082804" y="2697894"/>
+            <a:ext cx="3581560" cy="2358082"/>
+          </a:xfrm>
+          <a:prstGeom prst="straightConnector1">
+            <a:avLst/>
+          </a:prstGeom>
+          <a:ln w="19050">
+            <a:prstDash val="lgDash"/>
+            <a:headEnd type="triangle"/>
+            <a:tailEnd type="triangle"/>
+          </a:ln>
+        </p:spPr>
+        <p:style>
+          <a:lnRef idx="1">
+            <a:schemeClr val="accent1"/>
+          </a:lnRef>
+          <a:fillRef idx="0">
+            <a:schemeClr val="accent1"/>
+          </a:fillRef>
+          <a:effectRef idx="0">
+            <a:schemeClr val="accent1"/>
+          </a:effectRef>
+          <a:fontRef idx="minor">
+            <a:schemeClr val="tx1"/>
+          </a:fontRef>
+        </p:style>
+      </p:cxnSp>
+      <p:cxnSp>
+        <p:nvCxnSpPr>
+          <p:cNvPr id="21" name="Straight Arrow Connector 20">
+            <a:extLst>
+              <a:ext uri="{FF2B5EF4-FFF2-40B4-BE49-F238E27FC236}">
+                <a16:creationId xmlns:a16="http://schemas.microsoft.com/office/drawing/2014/main" id="{AC701020-5607-4379-BD49-93F9AED0E0FE}"/>
+              </a:ext>
+            </a:extLst>
+          </p:cNvPr>
+          <p:cNvCxnSpPr>
+            <a:cxnSpLocks/>
+            <a:stCxn id="10" idx="0"/>
+          </p:cNvCxnSpPr>
+          <p:nvPr/>
+        </p:nvCxnSpPr>
+        <p:spPr>
+          <a:xfrm flipV="1">
+            <a:off x="3147539" y="2723127"/>
+            <a:ext cx="2200375" cy="2332848"/>
+          </a:xfrm>
+          <a:prstGeom prst="straightConnector1">
+            <a:avLst/>
+          </a:prstGeom>
+          <a:ln w="19050">
+            <a:prstDash val="lgDash"/>
+            <a:headEnd type="triangle"/>
+            <a:tailEnd type="triangle"/>
+          </a:ln>
+        </p:spPr>
+        <p:style>
+          <a:lnRef idx="1">
+            <a:schemeClr val="accent1"/>
+          </a:lnRef>
+          <a:fillRef idx="0">
+            <a:schemeClr val="accent1"/>
+          </a:fillRef>
+          <a:effectRef idx="0">
+            <a:schemeClr val="accent1"/>
+          </a:effectRef>
+          <a:fontRef idx="minor">
+            <a:schemeClr val="tx1"/>
+          </a:fontRef>
+        </p:style>
+      </p:cxnSp>
+      <p:cxnSp>
+        <p:nvCxnSpPr>
+          <p:cNvPr id="23" name="Straight Arrow Connector 22">
+            <a:extLst>
+              <a:ext uri="{FF2B5EF4-FFF2-40B4-BE49-F238E27FC236}">
+                <a16:creationId xmlns:a16="http://schemas.microsoft.com/office/drawing/2014/main" id="{34291291-D456-40B9-8AEA-BC3F9EAD5A1D}"/>
+              </a:ext>
+            </a:extLst>
+          </p:cNvPr>
+          <p:cNvCxnSpPr>
+            <a:cxnSpLocks/>
+            <a:stCxn id="9" idx="0"/>
+          </p:cNvCxnSpPr>
+          <p:nvPr/>
+        </p:nvCxnSpPr>
+        <p:spPr>
+          <a:xfrm flipV="1">
+            <a:off x="5467862" y="2723125"/>
+            <a:ext cx="136913" cy="2332850"/>
+          </a:xfrm>
+          <a:prstGeom prst="straightConnector1">
+            <a:avLst/>
+          </a:prstGeom>
+          <a:ln w="19050">
+            <a:prstDash val="lgDash"/>
+            <a:headEnd type="triangle"/>
+            <a:tailEnd type="triangle"/>
+          </a:ln>
+        </p:spPr>
+        <p:style>
+          <a:lnRef idx="1">
+            <a:schemeClr val="accent1"/>
+          </a:lnRef>
+          <a:fillRef idx="0">
+            <a:schemeClr val="accent1"/>
+          </a:fillRef>
+          <a:effectRef idx="0">
+            <a:schemeClr val="accent1"/>
+          </a:effectRef>
+          <a:fontRef idx="minor">
+            <a:schemeClr val="tx1"/>
+          </a:fontRef>
+        </p:style>
+      </p:cxnSp>
+      <p:cxnSp>
+        <p:nvCxnSpPr>
+          <p:cNvPr id="25" name="Straight Arrow Connector 24">
+            <a:extLst>
+              <a:ext uri="{FF2B5EF4-FFF2-40B4-BE49-F238E27FC236}">
+                <a16:creationId xmlns:a16="http://schemas.microsoft.com/office/drawing/2014/main" id="{641CE366-403D-45AF-9BEF-77A639282905}"/>
+              </a:ext>
+            </a:extLst>
+          </p:cNvPr>
+          <p:cNvCxnSpPr>
+            <a:cxnSpLocks/>
+            <a:stCxn id="19" idx="0"/>
+          </p:cNvCxnSpPr>
+          <p:nvPr/>
+        </p:nvCxnSpPr>
+        <p:spPr>
+          <a:xfrm flipH="1" flipV="1">
+            <a:off x="6367242" y="2723127"/>
+            <a:ext cx="1363572" cy="2332848"/>
+          </a:xfrm>
+          <a:prstGeom prst="straightConnector1">
+            <a:avLst/>
+          </a:prstGeom>
+          <a:ln w="19050">
+            <a:prstDash val="lgDash"/>
+            <a:headEnd type="triangle"/>
+            <a:tailEnd type="triangle"/>
+          </a:ln>
+        </p:spPr>
+        <p:style>
+          <a:lnRef idx="1">
+            <a:schemeClr val="accent1"/>
+          </a:lnRef>
+          <a:fillRef idx="0">
+            <a:schemeClr val="accent1"/>
+          </a:fillRef>
+          <a:effectRef idx="0">
+            <a:schemeClr val="accent1"/>
+          </a:effectRef>
+          <a:fontRef idx="minor">
+            <a:schemeClr val="tx1"/>
+          </a:fontRef>
+        </p:style>
+      </p:cxnSp>
+      <p:cxnSp>
+        <p:nvCxnSpPr>
+          <p:cNvPr id="27" name="Straight Arrow Connector 26">
+            <a:extLst>
+              <a:ext uri="{FF2B5EF4-FFF2-40B4-BE49-F238E27FC236}">
+                <a16:creationId xmlns:a16="http://schemas.microsoft.com/office/drawing/2014/main" id="{A4728B07-27A8-4C8A-8437-353C3B63CB55}"/>
+              </a:ext>
+            </a:extLst>
+          </p:cNvPr>
+          <p:cNvCxnSpPr>
+            <a:stCxn id="20" idx="0"/>
+          </p:cNvCxnSpPr>
+          <p:nvPr/>
+        </p:nvCxnSpPr>
+        <p:spPr>
+          <a:xfrm flipH="1" flipV="1">
+            <a:off x="7199224" y="2723125"/>
+            <a:ext cx="2674471" cy="2332849"/>
+          </a:xfrm>
+          <a:prstGeom prst="straightConnector1">
+            <a:avLst/>
+          </a:prstGeom>
+          <a:ln w="19050">
+            <a:prstDash val="lgDash"/>
+            <a:headEnd type="triangle"/>
+            <a:tailEnd type="triangle"/>
+          </a:ln>
+        </p:spPr>
+        <p:style>
+          <a:lnRef idx="1">
+            <a:schemeClr val="accent1"/>
+          </a:lnRef>
+          <a:fillRef idx="0">
+            <a:schemeClr val="accent1"/>
+          </a:fillRef>
+          <a:effectRef idx="0">
+            <a:schemeClr val="accent1"/>
+          </a:effectRef>
+          <a:fontRef idx="minor">
+            <a:schemeClr val="tx1"/>
+          </a:fontRef>
+        </p:style>
+      </p:cxnSp>
+      <p:cxnSp>
+        <p:nvCxnSpPr>
+          <p:cNvPr id="1025" name="Straight Arrow Connector 1024">
+            <a:extLst>
+              <a:ext uri="{FF2B5EF4-FFF2-40B4-BE49-F238E27FC236}">
+                <a16:creationId xmlns:a16="http://schemas.microsoft.com/office/drawing/2014/main" id="{4EC99B43-467B-407D-891D-CEF4D1020565}"/>
+              </a:ext>
+            </a:extLst>
+          </p:cNvPr>
+          <p:cNvCxnSpPr>
+            <a:cxnSpLocks/>
+            <a:stCxn id="8" idx="3"/>
+            <a:endCxn id="11" idx="1"/>
+          </p:cNvCxnSpPr>
+          <p:nvPr/>
+        </p:nvCxnSpPr>
+        <p:spPr>
+          <a:xfrm flipV="1">
+            <a:off x="7941274" y="2397730"/>
+            <a:ext cx="831982" cy="1"/>
+          </a:xfrm>
+          <a:prstGeom prst="straightConnector1">
+            <a:avLst/>
+          </a:prstGeom>
+          <a:ln w="19050">
+            <a:prstDash val="lgDash"/>
+            <a:headEnd type="triangle"/>
+            <a:tailEnd type="triangle"/>
+          </a:ln>
+        </p:spPr>
+        <p:style>
+          <a:lnRef idx="1">
+            <a:schemeClr val="accent1"/>
+          </a:lnRef>
+          <a:fillRef idx="0">
+            <a:schemeClr val="accent1"/>
+          </a:fillRef>
+          <a:effectRef idx="0">
+            <a:schemeClr val="accent1"/>
+          </a:effectRef>
+          <a:fontRef idx="minor">
+            <a:schemeClr val="tx1"/>
+          </a:fontRef>
+        </p:style>
+      </p:cxnSp>
+      <p:sp>
+        <p:nvSpPr>
+          <p:cNvPr id="2" name="TextBox 1">
+            <a:extLst>
+              <a:ext uri="{FF2B5EF4-FFF2-40B4-BE49-F238E27FC236}">
+                <a16:creationId xmlns:a16="http://schemas.microsoft.com/office/drawing/2014/main" id="{0B362CCE-870D-4F05-870C-E92F0A065718}"/>
+              </a:ext>
+            </a:extLst>
+          </p:cNvPr>
+          <p:cNvSpPr txBox="1"/>
+          <p:nvPr/>
+        </p:nvSpPr>
+        <p:spPr>
+          <a:xfrm>
+            <a:off x="3934692" y="536579"/>
+            <a:ext cx="3881319" cy="369332"/>
+          </a:xfrm>
+          <a:prstGeom prst="rect">
+            <a:avLst/>
+          </a:prstGeom>
+          <a:noFill/>
+        </p:spPr>
+        <p:txBody>
+          <a:bodyPr wrap="none" rtlCol="0">
+            <a:spAutoFit/>
+          </a:bodyPr>
+          <a:lstStyle/>
+          <a:p>
+            <a:r>
+              <a:rPr lang="en-US" dirty="0"/>
+              <a:t>Centralized Configuration Management</a:t>
+            </a:r>
+            <a:endParaRPr lang="en-IN" dirty="0"/>
+          </a:p>
+        </p:txBody>
+      </p:sp>
+    </p:spTree>
+    <p:extLst>
+      <p:ext uri="{BB962C8B-B14F-4D97-AF65-F5344CB8AC3E}">
+        <p14:creationId xmlns:p14="http://schemas.microsoft.com/office/powerpoint/2010/main" val="4182305709"/>
+      </p:ext>
+    </p:extLst>
+  </p:cSld>
+  <p:clrMapOvr>
+    <a:masterClrMapping/>
+  </p:clrMapOvr>
+</p:sld>
+</file>
+
+<file path=ppt/slides/slide3.xml><?xml version="1.0" encoding="utf-8"?>
+<p:sld xmlns:a="http://schemas.openxmlformats.org/drawingml/2006/main" xmlns:r="http://schemas.openxmlformats.org/officeDocument/2006/relationships" xmlns:p="http://schemas.openxmlformats.org/presentationml/2006/main">
+  <p:cSld>
+    <p:spTree>
+      <p:nvGrpSpPr>
+        <p:cNvPr id="1" name=""/>
+        <p:cNvGrpSpPr/>
+        <p:nvPr/>
+      </p:nvGrpSpPr>
+      <p:grpSpPr>
+        <a:xfrm>
+          <a:off x="0" y="0"/>
+          <a:ext cx="0" cy="0"/>
+          <a:chOff x="0" y="0"/>
+          <a:chExt cx="0" cy="0"/>
+        </a:xfrm>
+      </p:grpSpPr>
+      <p:sp>
+        <p:nvSpPr>
+          <p:cNvPr id="31" name="Oval 30">
+            <a:extLst>
+              <a:ext uri="{FF2B5EF4-FFF2-40B4-BE49-F238E27FC236}">
+                <a16:creationId xmlns:a16="http://schemas.microsoft.com/office/drawing/2014/main" id="{C09590EB-637F-42C4-A57F-DB734FBBAB76}"/>
+              </a:ext>
+            </a:extLst>
+          </p:cNvPr>
+          <p:cNvSpPr/>
+          <p:nvPr/>
+        </p:nvSpPr>
+        <p:spPr>
+          <a:xfrm>
+            <a:off x="10146616" y="2667099"/>
+            <a:ext cx="1586854" cy="978533"/>
+          </a:xfrm>
+          <a:prstGeom prst="ellipse">
+            <a:avLst/>
+          </a:prstGeom>
+          <a:solidFill>
+            <a:schemeClr val="accent5">
+              <a:lumMod val="20000"/>
+              <a:lumOff val="80000"/>
+            </a:schemeClr>
+          </a:solidFill>
+        </p:spPr>
+        <p:style>
+          <a:lnRef idx="2">
+            <a:schemeClr val="accent1">
+              <a:shade val="50000"/>
+            </a:schemeClr>
+          </a:lnRef>
+          <a:fillRef idx="1">
+            <a:schemeClr val="accent1"/>
+          </a:fillRef>
+          <a:effectRef idx="0">
+            <a:schemeClr val="accent1"/>
+          </a:effectRef>
+          <a:fontRef idx="minor">
+            <a:schemeClr val="lt1"/>
+          </a:fontRef>
+        </p:style>
+        <p:txBody>
+          <a:bodyPr rtlCol="0" anchor="ctr"/>
+          <a:lstStyle/>
+          <a:p>
+            <a:pPr algn="ctr"/>
+            <a:endParaRPr lang="en-IN"/>
+          </a:p>
+        </p:txBody>
+      </p:sp>
+      <p:sp>
+        <p:nvSpPr>
+          <p:cNvPr id="2" name="Title 1">
+            <a:extLst>
+              <a:ext uri="{FF2B5EF4-FFF2-40B4-BE49-F238E27FC236}">
+                <a16:creationId xmlns:a16="http://schemas.microsoft.com/office/drawing/2014/main" id="{B92D6B4E-D772-40C5-9BF3-E59F3DF05A82}"/>
+              </a:ext>
+            </a:extLst>
+          </p:cNvPr>
+          <p:cNvSpPr>
+            <a:spLocks noGrp="1"/>
+          </p:cNvSpPr>
+          <p:nvPr>
+            <p:ph type="title"/>
+          </p:nvPr>
+        </p:nvSpPr>
+        <p:spPr>
+          <a:xfrm>
+            <a:off x="4119129" y="97272"/>
+            <a:ext cx="3953741" cy="299893"/>
+          </a:xfrm>
+        </p:spPr>
+        <p:txBody>
+          <a:bodyPr>
+            <a:noAutofit/>
+          </a:bodyPr>
+          <a:lstStyle/>
+          <a:p>
+            <a:pPr algn="ctr"/>
+            <a:r>
+              <a:rPr lang="en-US" sz="2400" dirty="0"/>
+              <a:t>Attendance System Diagram</a:t>
+            </a:r>
+            <a:endParaRPr lang="en-IN" sz="2400" dirty="0"/>
+          </a:p>
+        </p:txBody>
+      </p:sp>
+      <p:sp>
+        <p:nvSpPr>
+          <p:cNvPr id="4" name="Cylinder 3">
+            <a:extLst>
+              <a:ext uri="{FF2B5EF4-FFF2-40B4-BE49-F238E27FC236}">
+                <a16:creationId xmlns:a16="http://schemas.microsoft.com/office/drawing/2014/main" id="{9C8B1392-7240-42A6-A9D4-9E4B5F1F8CC8}"/>
+              </a:ext>
+            </a:extLst>
+          </p:cNvPr>
+          <p:cNvSpPr/>
+          <p:nvPr/>
+        </p:nvSpPr>
+        <p:spPr>
+          <a:xfrm>
+            <a:off x="10482100" y="4888732"/>
+            <a:ext cx="1103871" cy="1093572"/>
+          </a:xfrm>
+          <a:prstGeom prst="can">
+            <a:avLst/>
+          </a:prstGeom>
+          <a:solidFill>
+            <a:schemeClr val="accent3">
+              <a:lumMod val="50000"/>
+            </a:schemeClr>
+          </a:solidFill>
+        </p:spPr>
+        <p:style>
+          <a:lnRef idx="2">
+            <a:schemeClr val="accent1">
+              <a:shade val="50000"/>
+            </a:schemeClr>
+          </a:lnRef>
+          <a:fillRef idx="1">
+            <a:schemeClr val="accent1"/>
+          </a:fillRef>
+          <a:effectRef idx="0">
+            <a:schemeClr val="accent1"/>
+          </a:effectRef>
+          <a:fontRef idx="minor">
+            <a:schemeClr val="lt1"/>
+          </a:fontRef>
+        </p:style>
+        <p:txBody>
+          <a:bodyPr rtlCol="0" anchor="ctr"/>
+          <a:lstStyle/>
+          <a:p>
+            <a:pPr algn="ctr"/>
+            <a:endParaRPr lang="en-IN"/>
+          </a:p>
+        </p:txBody>
+      </p:sp>
+      <p:sp>
+        <p:nvSpPr>
+          <p:cNvPr id="5" name="Cylinder 4">
+            <a:extLst>
+              <a:ext uri="{FF2B5EF4-FFF2-40B4-BE49-F238E27FC236}">
+                <a16:creationId xmlns:a16="http://schemas.microsoft.com/office/drawing/2014/main" id="{09F51B0F-54D1-4856-81D6-A8264FA38AA1}"/>
+              </a:ext>
+            </a:extLst>
+          </p:cNvPr>
+          <p:cNvSpPr/>
+          <p:nvPr/>
+        </p:nvSpPr>
+        <p:spPr>
+          <a:xfrm>
+            <a:off x="10416230" y="520084"/>
+            <a:ext cx="1103871" cy="1093572"/>
+          </a:xfrm>
+          <a:prstGeom prst="can">
+            <a:avLst/>
+          </a:prstGeom>
+          <a:solidFill>
+            <a:schemeClr val="accent3">
+              <a:lumMod val="50000"/>
+            </a:schemeClr>
+          </a:solidFill>
+        </p:spPr>
+        <p:style>
+          <a:lnRef idx="2">
+            <a:schemeClr val="accent1">
+              <a:shade val="50000"/>
+            </a:schemeClr>
+          </a:lnRef>
+          <a:fillRef idx="1">
+            <a:schemeClr val="accent1"/>
+          </a:fillRef>
+          <a:effectRef idx="0">
+            <a:schemeClr val="accent1"/>
+          </a:effectRef>
+          <a:fontRef idx="minor">
+            <a:schemeClr val="lt1"/>
+          </a:fontRef>
+        </p:style>
+        <p:txBody>
+          <a:bodyPr rtlCol="0" anchor="ctr"/>
+          <a:lstStyle/>
+          <a:p>
+            <a:pPr algn="ctr"/>
+            <a:endParaRPr lang="en-IN"/>
+          </a:p>
+        </p:txBody>
+      </p:sp>
+      <p:pic>
+        <p:nvPicPr>
+          <p:cNvPr id="6" name="Picture 5">
+            <a:extLst>
+              <a:ext uri="{FF2B5EF4-FFF2-40B4-BE49-F238E27FC236}">
+                <a16:creationId xmlns:a16="http://schemas.microsoft.com/office/drawing/2014/main" id="{26CAC158-FFFB-47F7-9468-F5FF08589A7B}"/>
+              </a:ext>
+            </a:extLst>
+          </p:cNvPr>
+          <p:cNvPicPr>
+            <a:picLocks noChangeAspect="1"/>
+          </p:cNvPicPr>
+          <p:nvPr/>
+        </p:nvPicPr>
+        <p:blipFill>
+          <a:blip r:embed="rId2"/>
+          <a:stretch>
+            <a:fillRect/>
+          </a:stretch>
+        </p:blipFill>
+        <p:spPr>
+          <a:xfrm>
+            <a:off x="10562723" y="5248722"/>
+            <a:ext cx="970886" cy="558604"/>
+          </a:xfrm>
+          <a:prstGeom prst="rect">
+            <a:avLst/>
+          </a:prstGeom>
+        </p:spPr>
+      </p:pic>
+      <p:pic>
+        <p:nvPicPr>
+          <p:cNvPr id="7" name="Picture 4" descr="Apache cassandra logo - Social media &amp; Logos Icons">
+            <a:extLst>
+              <a:ext uri="{FF2B5EF4-FFF2-40B4-BE49-F238E27FC236}">
+                <a16:creationId xmlns:a16="http://schemas.microsoft.com/office/drawing/2014/main" id="{A91C9C9F-A425-47D7-81EC-545A88E42794}"/>
+              </a:ext>
+            </a:extLst>
+          </p:cNvPr>
+          <p:cNvPicPr>
+            <a:picLocks noChangeAspect="1" noChangeArrowheads="1"/>
+          </p:cNvPicPr>
+          <p:nvPr/>
+        </p:nvPicPr>
+        <p:blipFill>
+          <a:blip r:embed="rId3">
+            <a:extLst>
+              <a:ext uri="{28A0092B-C50C-407E-A947-70E740481C1C}">
+                <a14:useLocalDpi xmlns:a14="http://schemas.microsoft.com/office/drawing/2010/main" val="0"/>
+              </a:ext>
+            </a:extLst>
+          </a:blip>
+          <a:srcRect/>
+          <a:stretch>
+            <a:fillRect/>
+          </a:stretch>
+        </p:blipFill>
+        <p:spPr bwMode="auto">
+          <a:xfrm>
+            <a:off x="10482100" y="875696"/>
+            <a:ext cx="981332" cy="558604"/>
+          </a:xfrm>
+          <a:prstGeom prst="rect">
+            <a:avLst/>
+          </a:prstGeom>
+          <a:noFill/>
+          <a:extLst>
+            <a:ext uri="{909E8E84-426E-40DD-AFC4-6F175D3DCCD1}">
+              <a14:hiddenFill xmlns:a14="http://schemas.microsoft.com/office/drawing/2010/main">
+                <a:solidFill>
+                  <a:srgbClr val="FFFFFF"/>
+                </a:solidFill>
+              </a14:hiddenFill>
+            </a:ext>
+          </a:extLst>
+        </p:spPr>
+      </p:pic>
+      <p:sp>
+        <p:nvSpPr>
+          <p:cNvPr id="8" name="Rectangle: Rounded Corners 7">
+            <a:extLst>
+              <a:ext uri="{FF2B5EF4-FFF2-40B4-BE49-F238E27FC236}">
+                <a16:creationId xmlns:a16="http://schemas.microsoft.com/office/drawing/2014/main" id="{B4B44D0C-E68A-40ED-AE77-0524EBA313B6}"/>
+              </a:ext>
+            </a:extLst>
+          </p:cNvPr>
+          <p:cNvSpPr/>
+          <p:nvPr/>
+        </p:nvSpPr>
+        <p:spPr>
+          <a:xfrm rot="16200000">
+            <a:off x="-1331944" y="3094886"/>
+            <a:ext cx="5423653" cy="650789"/>
+          </a:xfrm>
+          <a:prstGeom prst="roundRect">
+            <a:avLst/>
+          </a:prstGeom>
+          <a:solidFill>
+            <a:schemeClr val="accent2">
+              <a:lumMod val="60000"/>
+              <a:lumOff val="40000"/>
+            </a:schemeClr>
+          </a:solidFill>
+        </p:spPr>
+        <p:style>
+          <a:lnRef idx="2">
+            <a:schemeClr val="accent1">
+              <a:shade val="50000"/>
+            </a:schemeClr>
+          </a:lnRef>
+          <a:fillRef idx="1">
+            <a:schemeClr val="accent1"/>
+          </a:fillRef>
+          <a:effectRef idx="0">
+            <a:schemeClr val="accent1"/>
+          </a:effectRef>
+          <a:fontRef idx="minor">
+            <a:schemeClr val="lt1"/>
+          </a:fontRef>
+        </p:style>
+        <p:txBody>
+          <a:bodyPr rtlCol="0" anchor="ctr"/>
+          <a:lstStyle/>
+          <a:p>
+            <a:pPr algn="ctr"/>
+            <a:r>
+              <a:rPr lang="en-US" dirty="0"/>
+              <a:t>attendance-system-</a:t>
+            </a:r>
+            <a:r>
+              <a:rPr lang="en-US" dirty="0" err="1"/>
+              <a:t>api</a:t>
+            </a:r>
+            <a:r>
+              <a:rPr lang="en-US" dirty="0"/>
+              <a:t>-gateway</a:t>
+            </a:r>
+            <a:endParaRPr lang="en-IN" dirty="0"/>
+          </a:p>
+        </p:txBody>
+      </p:sp>
+      <p:sp>
+        <p:nvSpPr>
+          <p:cNvPr id="9" name="Rectangle 8">
+            <a:extLst>
+              <a:ext uri="{FF2B5EF4-FFF2-40B4-BE49-F238E27FC236}">
+                <a16:creationId xmlns:a16="http://schemas.microsoft.com/office/drawing/2014/main" id="{E5C6C725-016E-47AF-98CA-A15B4A831E14}"/>
+              </a:ext>
+            </a:extLst>
+          </p:cNvPr>
+          <p:cNvSpPr/>
+          <p:nvPr/>
+        </p:nvSpPr>
+        <p:spPr>
+          <a:xfrm>
+            <a:off x="101601" y="3060872"/>
+            <a:ext cx="563418" cy="469365"/>
+          </a:xfrm>
+          <a:prstGeom prst="rect">
+            <a:avLst/>
+          </a:prstGeom>
+        </p:spPr>
+        <p:style>
+          <a:lnRef idx="2">
+            <a:schemeClr val="accent1">
+              <a:shade val="50000"/>
+            </a:schemeClr>
+          </a:lnRef>
+          <a:fillRef idx="1">
+            <a:schemeClr val="accent1"/>
+          </a:fillRef>
+          <a:effectRef idx="0">
+            <a:schemeClr val="accent1"/>
+          </a:effectRef>
+          <a:fontRef idx="minor">
+            <a:schemeClr val="lt1"/>
+          </a:fontRef>
+        </p:style>
+        <p:txBody>
+          <a:bodyPr rtlCol="0" anchor="ctr"/>
+          <a:lstStyle/>
+          <a:p>
+            <a:pPr algn="ctr"/>
+            <a:r>
+              <a:rPr lang="en-US" sz="1200" dirty="0"/>
+              <a:t>Client</a:t>
+            </a:r>
+            <a:endParaRPr lang="en-IN" sz="1200" dirty="0"/>
+          </a:p>
+        </p:txBody>
+      </p:sp>
+      <p:cxnSp>
+        <p:nvCxnSpPr>
+          <p:cNvPr id="11" name="Straight Arrow Connector 10">
+            <a:extLst>
+              <a:ext uri="{FF2B5EF4-FFF2-40B4-BE49-F238E27FC236}">
+                <a16:creationId xmlns:a16="http://schemas.microsoft.com/office/drawing/2014/main" id="{24B91AE6-1CD8-4920-AF79-CF75D6563D64}"/>
+              </a:ext>
+            </a:extLst>
+          </p:cNvPr>
+          <p:cNvCxnSpPr>
+            <a:stCxn id="9" idx="3"/>
+          </p:cNvCxnSpPr>
+          <p:nvPr/>
+        </p:nvCxnSpPr>
+        <p:spPr>
+          <a:xfrm flipV="1">
+            <a:off x="665019" y="3295554"/>
+            <a:ext cx="389468" cy="1"/>
+          </a:xfrm>
+          <a:prstGeom prst="straightConnector1">
+            <a:avLst/>
+          </a:prstGeom>
+          <a:ln>
+            <a:headEnd type="triangle"/>
+            <a:tailEnd type="triangle"/>
+          </a:ln>
+        </p:spPr>
+        <p:style>
+          <a:lnRef idx="1">
+            <a:schemeClr val="accent1"/>
+          </a:lnRef>
+          <a:fillRef idx="0">
+            <a:schemeClr val="accent1"/>
+          </a:fillRef>
+          <a:effectRef idx="0">
+            <a:schemeClr val="accent1"/>
+          </a:effectRef>
+          <a:fontRef idx="minor">
+            <a:schemeClr val="tx1"/>
+          </a:fontRef>
+        </p:style>
+      </p:cxnSp>
+      <p:sp>
+        <p:nvSpPr>
+          <p:cNvPr id="12" name="Rectangle: Rounded Corners 11">
+            <a:extLst>
+              <a:ext uri="{FF2B5EF4-FFF2-40B4-BE49-F238E27FC236}">
+                <a16:creationId xmlns:a16="http://schemas.microsoft.com/office/drawing/2014/main" id="{2E933BCC-EA1C-4DE4-AD68-C5BC8901DC86}"/>
+              </a:ext>
+            </a:extLst>
+          </p:cNvPr>
+          <p:cNvSpPr/>
+          <p:nvPr/>
+        </p:nvSpPr>
+        <p:spPr>
+          <a:xfrm>
+            <a:off x="2066283" y="744892"/>
+            <a:ext cx="2091627" cy="381999"/>
+          </a:xfrm>
+          <a:prstGeom prst="roundRect">
+            <a:avLst/>
+          </a:prstGeom>
+        </p:spPr>
+        <p:style>
+          <a:lnRef idx="2">
+            <a:schemeClr val="accent1">
+              <a:shade val="50000"/>
+            </a:schemeClr>
+          </a:lnRef>
+          <a:fillRef idx="1">
+            <a:schemeClr val="accent1"/>
+          </a:fillRef>
+          <a:effectRef idx="0">
+            <a:schemeClr val="accent1"/>
+          </a:effectRef>
+          <a:fontRef idx="minor">
+            <a:schemeClr val="lt1"/>
+          </a:fontRef>
+        </p:style>
+        <p:txBody>
+          <a:bodyPr rtlCol="0" anchor="ctr"/>
+          <a:lstStyle/>
+          <a:p>
+            <a:pPr algn="ctr"/>
+            <a:r>
+              <a:rPr lang="en-US" sz="1200" dirty="0"/>
+              <a:t>attendance-service-</a:t>
+            </a:r>
+            <a:r>
+              <a:rPr lang="en-US" sz="1200" dirty="0" err="1"/>
+              <a:t>graphql</a:t>
+            </a:r>
+            <a:endParaRPr lang="en-IN" sz="1200" dirty="0"/>
+          </a:p>
+        </p:txBody>
+      </p:sp>
+      <p:cxnSp>
+        <p:nvCxnSpPr>
+          <p:cNvPr id="17" name="Straight Arrow Connector 16">
+            <a:extLst>
+              <a:ext uri="{FF2B5EF4-FFF2-40B4-BE49-F238E27FC236}">
+                <a16:creationId xmlns:a16="http://schemas.microsoft.com/office/drawing/2014/main" id="{09B82B5E-3799-4FBC-BDCE-E157E9869363}"/>
+              </a:ext>
+            </a:extLst>
+          </p:cNvPr>
+          <p:cNvCxnSpPr>
+            <a:endCxn id="12" idx="1"/>
+          </p:cNvCxnSpPr>
+          <p:nvPr/>
+        </p:nvCxnSpPr>
+        <p:spPr>
+          <a:xfrm>
+            <a:off x="1744059" y="935891"/>
+            <a:ext cx="322224" cy="1"/>
+          </a:xfrm>
+          <a:prstGeom prst="straightConnector1">
+            <a:avLst/>
+          </a:prstGeom>
+          <a:ln>
+            <a:headEnd type="triangle"/>
+            <a:tailEnd type="triangle"/>
+          </a:ln>
+        </p:spPr>
+        <p:style>
+          <a:lnRef idx="1">
+            <a:schemeClr val="accent1"/>
+          </a:lnRef>
+          <a:fillRef idx="0">
+            <a:schemeClr val="accent1"/>
+          </a:fillRef>
+          <a:effectRef idx="0">
+            <a:schemeClr val="accent1"/>
+          </a:effectRef>
+          <a:fontRef idx="minor">
+            <a:schemeClr val="tx1"/>
+          </a:fontRef>
+        </p:style>
+      </p:cxnSp>
+      <p:sp>
+        <p:nvSpPr>
+          <p:cNvPr id="21" name="TextBox 20">
+            <a:extLst>
+              <a:ext uri="{FF2B5EF4-FFF2-40B4-BE49-F238E27FC236}">
+                <a16:creationId xmlns:a16="http://schemas.microsoft.com/office/drawing/2014/main" id="{0BC8A49B-706F-4887-B70C-2A908B372D5A}"/>
+              </a:ext>
+            </a:extLst>
+          </p:cNvPr>
+          <p:cNvSpPr txBox="1"/>
+          <p:nvPr/>
+        </p:nvSpPr>
+        <p:spPr>
+          <a:xfrm rot="16200000">
+            <a:off x="2692527" y="2941824"/>
+            <a:ext cx="720436" cy="253916"/>
+          </a:xfrm>
+          <a:prstGeom prst="rect">
+            <a:avLst/>
+          </a:prstGeom>
+          <a:noFill/>
+        </p:spPr>
+        <p:txBody>
+          <a:bodyPr wrap="square" rtlCol="0">
+            <a:spAutoFit/>
+          </a:bodyPr>
+          <a:lstStyle/>
+          <a:p>
+            <a:r>
+              <a:rPr lang="en-US" sz="1050" dirty="0" err="1"/>
+              <a:t>GraphQL</a:t>
+            </a:r>
+            <a:endParaRPr lang="en-IN" sz="1050" dirty="0"/>
+          </a:p>
+        </p:txBody>
+      </p:sp>
+      <p:sp>
+        <p:nvSpPr>
+          <p:cNvPr id="27" name="TextBox 26">
+            <a:extLst>
+              <a:ext uri="{FF2B5EF4-FFF2-40B4-BE49-F238E27FC236}">
+                <a16:creationId xmlns:a16="http://schemas.microsoft.com/office/drawing/2014/main" id="{698BE517-C168-4069-A5C2-69D966B39EEA}"/>
+              </a:ext>
+            </a:extLst>
+          </p:cNvPr>
+          <p:cNvSpPr txBox="1"/>
+          <p:nvPr/>
+        </p:nvSpPr>
+        <p:spPr>
+          <a:xfrm>
+            <a:off x="7960173" y="717373"/>
+            <a:ext cx="1920719" cy="253916"/>
+          </a:xfrm>
+          <a:prstGeom prst="rect">
+            <a:avLst/>
+          </a:prstGeom>
+          <a:noFill/>
+        </p:spPr>
+        <p:txBody>
+          <a:bodyPr wrap="none" rtlCol="0">
+            <a:spAutoFit/>
+          </a:bodyPr>
+          <a:lstStyle/>
+          <a:p>
+            <a:r>
+              <a:rPr lang="en-US" sz="1050" dirty="0"/>
+              <a:t>HTTP POST Writes swipe events</a:t>
+            </a:r>
+            <a:endParaRPr lang="en-IN" sz="1050" dirty="0"/>
+          </a:p>
+        </p:txBody>
+      </p:sp>
+      <p:sp>
+        <p:nvSpPr>
+          <p:cNvPr id="28" name="Rectangle: Rounded Corners 27">
+            <a:extLst>
+              <a:ext uri="{FF2B5EF4-FFF2-40B4-BE49-F238E27FC236}">
+                <a16:creationId xmlns:a16="http://schemas.microsoft.com/office/drawing/2014/main" id="{6FE28E8E-32A6-4A9E-A6C0-3E686BC6261F}"/>
+              </a:ext>
+            </a:extLst>
+          </p:cNvPr>
+          <p:cNvSpPr/>
+          <p:nvPr/>
+        </p:nvSpPr>
+        <p:spPr>
+          <a:xfrm>
+            <a:off x="5104828" y="1804603"/>
+            <a:ext cx="2180071" cy="325394"/>
+          </a:xfrm>
+          <a:prstGeom prst="roundRect">
+            <a:avLst/>
+          </a:prstGeom>
+        </p:spPr>
+        <p:style>
+          <a:lnRef idx="2">
+            <a:schemeClr val="accent1">
+              <a:shade val="50000"/>
+            </a:schemeClr>
+          </a:lnRef>
+          <a:fillRef idx="1">
+            <a:schemeClr val="accent1"/>
+          </a:fillRef>
+          <a:effectRef idx="0">
+            <a:schemeClr val="accent1"/>
+          </a:effectRef>
+          <a:fontRef idx="minor">
+            <a:schemeClr val="lt1"/>
+          </a:fontRef>
+        </p:style>
+        <p:txBody>
+          <a:bodyPr rtlCol="0" anchor="ctr"/>
+          <a:lstStyle/>
+          <a:p>
+            <a:pPr algn="ctr"/>
+            <a:r>
+              <a:rPr lang="en-US" sz="1200" dirty="0"/>
+              <a:t>attendance-calculation-service</a:t>
+            </a:r>
+            <a:endParaRPr lang="en-IN" sz="1200" dirty="0"/>
+          </a:p>
+        </p:txBody>
+      </p:sp>
+      <p:pic>
+        <p:nvPicPr>
+          <p:cNvPr id="30" name="Picture 6" descr="asf - Revision 1916058: /kafka/site/logos/originals/png">
+            <a:extLst>
+              <a:ext uri="{FF2B5EF4-FFF2-40B4-BE49-F238E27FC236}">
+                <a16:creationId xmlns:a16="http://schemas.microsoft.com/office/drawing/2014/main" id="{2AE22D79-471C-4DA6-8091-CCB767BF5C6B}"/>
+              </a:ext>
+            </a:extLst>
+          </p:cNvPr>
+          <p:cNvPicPr>
+            <a:picLocks noChangeAspect="1" noChangeArrowheads="1"/>
+          </p:cNvPicPr>
+          <p:nvPr/>
+        </p:nvPicPr>
+        <p:blipFill>
+          <a:blip r:embed="rId4">
+            <a:extLst>
+              <a:ext uri="{28A0092B-C50C-407E-A947-70E740481C1C}">
+                <a14:useLocalDpi xmlns:a14="http://schemas.microsoft.com/office/drawing/2010/main" val="0"/>
+              </a:ext>
+            </a:extLst>
+          </a:blip>
+          <a:srcRect/>
+          <a:stretch>
+            <a:fillRect/>
+          </a:stretch>
+        </p:blipFill>
+        <p:spPr bwMode="auto">
+          <a:xfrm>
+            <a:off x="10204634" y="2757115"/>
+            <a:ext cx="1470818" cy="773122"/>
+          </a:xfrm>
+          <a:prstGeom prst="rect">
+            <a:avLst/>
+          </a:prstGeom>
+          <a:noFill/>
+          <a:extLst>
+            <a:ext uri="{909E8E84-426E-40DD-AFC4-6F175D3DCCD1}">
+              <a14:hiddenFill xmlns:a14="http://schemas.microsoft.com/office/drawing/2010/main">
+                <a:solidFill>
+                  <a:srgbClr val="FFFFFF"/>
+                </a:solidFill>
+              </a14:hiddenFill>
+            </a:ext>
+          </a:extLst>
+        </p:spPr>
+      </p:pic>
+      <p:cxnSp>
+        <p:nvCxnSpPr>
+          <p:cNvPr id="33" name="Connector: Elbow 32">
+            <a:extLst>
+              <a:ext uri="{FF2B5EF4-FFF2-40B4-BE49-F238E27FC236}">
+                <a16:creationId xmlns:a16="http://schemas.microsoft.com/office/drawing/2014/main" id="{0E08B318-C03B-4548-A05B-0537639BF541}"/>
+              </a:ext>
+            </a:extLst>
+          </p:cNvPr>
+          <p:cNvCxnSpPr>
+            <a:cxnSpLocks/>
+            <a:stCxn id="5" idx="2"/>
+            <a:endCxn id="28" idx="3"/>
+          </p:cNvCxnSpPr>
+          <p:nvPr/>
+        </p:nvCxnSpPr>
+        <p:spPr>
+          <a:xfrm rot="10800000" flipV="1">
+            <a:off x="7284900" y="1066870"/>
+            <a:ext cx="3131331" cy="900430"/>
+          </a:xfrm>
+          <a:prstGeom prst="bentConnector3">
+            <a:avLst/>
+          </a:prstGeom>
+          <a:ln w="19050">
+            <a:solidFill>
+              <a:schemeClr val="tx1"/>
+            </a:solidFill>
+            <a:tailEnd type="triangle"/>
+          </a:ln>
+        </p:spPr>
+        <p:style>
+          <a:lnRef idx="1">
+            <a:schemeClr val="accent1"/>
+          </a:lnRef>
+          <a:fillRef idx="0">
+            <a:schemeClr val="accent1"/>
+          </a:fillRef>
+          <a:effectRef idx="0">
+            <a:schemeClr val="accent1"/>
+          </a:effectRef>
+          <a:fontRef idx="minor">
+            <a:schemeClr val="tx1"/>
+          </a:fontRef>
+        </p:style>
+      </p:cxnSp>
+      <p:sp>
+        <p:nvSpPr>
+          <p:cNvPr id="35" name="TextBox 34">
+            <a:extLst>
+              <a:ext uri="{FF2B5EF4-FFF2-40B4-BE49-F238E27FC236}">
+                <a16:creationId xmlns:a16="http://schemas.microsoft.com/office/drawing/2014/main" id="{2F2E8339-18B5-4834-9AF5-FFBC04A55BB2}"/>
+              </a:ext>
+            </a:extLst>
+          </p:cNvPr>
+          <p:cNvSpPr txBox="1"/>
+          <p:nvPr/>
+        </p:nvSpPr>
+        <p:spPr>
+          <a:xfrm>
+            <a:off x="7516368" y="1757789"/>
+            <a:ext cx="1303562" cy="261610"/>
+          </a:xfrm>
+          <a:prstGeom prst="rect">
+            <a:avLst/>
+          </a:prstGeom>
+          <a:noFill/>
+        </p:spPr>
+        <p:txBody>
+          <a:bodyPr wrap="none" rtlCol="0">
+            <a:spAutoFit/>
+          </a:bodyPr>
+          <a:lstStyle/>
+          <a:p>
+            <a:r>
+              <a:rPr lang="en-US" sz="1050" dirty="0"/>
+              <a:t>Reads swipe events</a:t>
+            </a:r>
+            <a:endParaRPr lang="en-IN" sz="1050" dirty="0"/>
+          </a:p>
+        </p:txBody>
+      </p:sp>
+      <p:cxnSp>
+        <p:nvCxnSpPr>
+          <p:cNvPr id="40" name="Connector: Elbow 39">
+            <a:extLst>
+              <a:ext uri="{FF2B5EF4-FFF2-40B4-BE49-F238E27FC236}">
+                <a16:creationId xmlns:a16="http://schemas.microsoft.com/office/drawing/2014/main" id="{AD4EBEEE-12A1-49A7-8494-49F2069458AB}"/>
+              </a:ext>
+            </a:extLst>
+          </p:cNvPr>
+          <p:cNvCxnSpPr>
+            <a:stCxn id="28" idx="2"/>
+            <a:endCxn id="31" idx="2"/>
+          </p:cNvCxnSpPr>
+          <p:nvPr/>
+        </p:nvCxnSpPr>
+        <p:spPr>
+          <a:xfrm rot="16200000" flipH="1">
+            <a:off x="7657556" y="667305"/>
+            <a:ext cx="1026369" cy="3951752"/>
+          </a:xfrm>
+          <a:prstGeom prst="bentConnector2">
+            <a:avLst/>
+          </a:prstGeom>
+          <a:ln w="19050">
+            <a:solidFill>
+              <a:schemeClr val="accent6">
+                <a:lumMod val="50000"/>
+              </a:schemeClr>
+            </a:solidFill>
+            <a:tailEnd type="triangle"/>
+          </a:ln>
+        </p:spPr>
+        <p:style>
+          <a:lnRef idx="1">
+            <a:schemeClr val="accent1"/>
+          </a:lnRef>
+          <a:fillRef idx="0">
+            <a:schemeClr val="accent1"/>
+          </a:fillRef>
+          <a:effectRef idx="0">
+            <a:schemeClr val="accent1"/>
+          </a:effectRef>
+          <a:fontRef idx="minor">
+            <a:schemeClr val="tx1"/>
+          </a:fontRef>
+        </p:style>
+      </p:cxnSp>
+      <p:sp>
+        <p:nvSpPr>
+          <p:cNvPr id="41" name="Rectangle: Rounded Corners 40">
+            <a:extLst>
+              <a:ext uri="{FF2B5EF4-FFF2-40B4-BE49-F238E27FC236}">
+                <a16:creationId xmlns:a16="http://schemas.microsoft.com/office/drawing/2014/main" id="{4E030C21-E6A3-4FF6-8CE1-CD516001A0A8}"/>
+              </a:ext>
+            </a:extLst>
+          </p:cNvPr>
+          <p:cNvSpPr/>
+          <p:nvPr/>
+        </p:nvSpPr>
+        <p:spPr>
+          <a:xfrm>
+            <a:off x="5104828" y="3652723"/>
+            <a:ext cx="2180072" cy="253916"/>
+          </a:xfrm>
+          <a:prstGeom prst="roundRect">
+            <a:avLst/>
+          </a:prstGeom>
+        </p:spPr>
+        <p:style>
+          <a:lnRef idx="2">
+            <a:schemeClr val="accent1">
+              <a:shade val="50000"/>
+            </a:schemeClr>
+          </a:lnRef>
+          <a:fillRef idx="1">
+            <a:schemeClr val="accent1"/>
+          </a:fillRef>
+          <a:effectRef idx="0">
+            <a:schemeClr val="accent1"/>
+          </a:effectRef>
+          <a:fontRef idx="minor">
+            <a:schemeClr val="lt1"/>
+          </a:fontRef>
+        </p:style>
+        <p:txBody>
+          <a:bodyPr rtlCol="0" anchor="ctr"/>
+          <a:lstStyle/>
+          <a:p>
+            <a:pPr algn="ctr"/>
+            <a:r>
+              <a:rPr lang="en-US" sz="1200" dirty="0"/>
+              <a:t>attendance-consumer-service</a:t>
+            </a:r>
+            <a:endParaRPr lang="en-IN" sz="1200" dirty="0"/>
+          </a:p>
+        </p:txBody>
+      </p:sp>
+      <p:cxnSp>
+        <p:nvCxnSpPr>
+          <p:cNvPr id="43" name="Connector: Elbow 42">
+            <a:extLst>
+              <a:ext uri="{FF2B5EF4-FFF2-40B4-BE49-F238E27FC236}">
+                <a16:creationId xmlns:a16="http://schemas.microsoft.com/office/drawing/2014/main" id="{F558FA7C-1ADF-4258-9B66-594B5A4B9C85}"/>
+              </a:ext>
+            </a:extLst>
+          </p:cNvPr>
+          <p:cNvCxnSpPr>
+            <a:stCxn id="31" idx="3"/>
+            <a:endCxn id="41" idx="3"/>
+          </p:cNvCxnSpPr>
+          <p:nvPr/>
+        </p:nvCxnSpPr>
+        <p:spPr>
+          <a:xfrm rot="5400000">
+            <a:off x="8693277" y="2093953"/>
+            <a:ext cx="277352" cy="3094105"/>
+          </a:xfrm>
+          <a:prstGeom prst="bentConnector2">
+            <a:avLst/>
+          </a:prstGeom>
+          <a:ln w="19050">
+            <a:solidFill>
+              <a:srgbClr val="00B050"/>
+            </a:solidFill>
+            <a:tailEnd type="triangle"/>
+          </a:ln>
+        </p:spPr>
+        <p:style>
+          <a:lnRef idx="1">
+            <a:schemeClr val="accent1"/>
+          </a:lnRef>
+          <a:fillRef idx="0">
+            <a:schemeClr val="accent1"/>
+          </a:fillRef>
+          <a:effectRef idx="0">
+            <a:schemeClr val="accent1"/>
+          </a:effectRef>
+          <a:fontRef idx="minor">
+            <a:schemeClr val="tx1"/>
+          </a:fontRef>
+        </p:style>
+      </p:cxnSp>
+      <p:cxnSp>
+        <p:nvCxnSpPr>
+          <p:cNvPr id="47" name="Connector: Elbow 46">
+            <a:extLst>
+              <a:ext uri="{FF2B5EF4-FFF2-40B4-BE49-F238E27FC236}">
+                <a16:creationId xmlns:a16="http://schemas.microsoft.com/office/drawing/2014/main" id="{FB8EEC92-0A98-4A97-954B-043CC1A98FB4}"/>
+              </a:ext>
+            </a:extLst>
+          </p:cNvPr>
+          <p:cNvCxnSpPr>
+            <a:cxnSpLocks/>
+            <a:stCxn id="41" idx="2"/>
+            <a:endCxn id="4" idx="2"/>
+          </p:cNvCxnSpPr>
+          <p:nvPr/>
+        </p:nvCxnSpPr>
+        <p:spPr>
+          <a:xfrm rot="16200000" flipH="1">
+            <a:off x="7574043" y="2527460"/>
+            <a:ext cx="1528879" cy="4287236"/>
+          </a:xfrm>
+          <a:prstGeom prst="bentConnector2">
+            <a:avLst/>
+          </a:prstGeom>
+          <a:ln w="19050">
+            <a:solidFill>
+              <a:schemeClr val="tx1"/>
+            </a:solidFill>
+            <a:tailEnd type="triangle"/>
+          </a:ln>
+        </p:spPr>
+        <p:style>
+          <a:lnRef idx="1">
+            <a:schemeClr val="accent1"/>
+          </a:lnRef>
+          <a:fillRef idx="0">
+            <a:schemeClr val="accent1"/>
+          </a:fillRef>
+          <a:effectRef idx="0">
+            <a:schemeClr val="accent1"/>
+          </a:effectRef>
+          <a:fontRef idx="minor">
+            <a:schemeClr val="tx1"/>
+          </a:fontRef>
+        </p:style>
+      </p:cxnSp>
+      <p:sp>
+        <p:nvSpPr>
+          <p:cNvPr id="49" name="Rectangle: Rounded Corners 48">
+            <a:extLst>
+              <a:ext uri="{FF2B5EF4-FFF2-40B4-BE49-F238E27FC236}">
+                <a16:creationId xmlns:a16="http://schemas.microsoft.com/office/drawing/2014/main" id="{27477FED-B961-4646-B2F7-B67B58544595}"/>
+              </a:ext>
+            </a:extLst>
+          </p:cNvPr>
+          <p:cNvSpPr/>
+          <p:nvPr/>
+        </p:nvSpPr>
+        <p:spPr>
+          <a:xfrm>
+            <a:off x="5377188" y="809516"/>
+            <a:ext cx="1688226" cy="252750"/>
+          </a:xfrm>
+          <a:prstGeom prst="roundRect">
+            <a:avLst/>
+          </a:prstGeom>
+        </p:spPr>
+        <p:style>
+          <a:lnRef idx="2">
+            <a:schemeClr val="accent1">
+              <a:shade val="50000"/>
+            </a:schemeClr>
+          </a:lnRef>
+          <a:fillRef idx="1">
+            <a:schemeClr val="accent1"/>
+          </a:fillRef>
+          <a:effectRef idx="0">
+            <a:schemeClr val="accent1"/>
+          </a:effectRef>
+          <a:fontRef idx="minor">
+            <a:schemeClr val="lt1"/>
+          </a:fontRef>
+        </p:style>
+        <p:txBody>
+          <a:bodyPr rtlCol="0" anchor="ctr"/>
+          <a:lstStyle/>
+          <a:p>
+            <a:pPr algn="ctr"/>
+            <a:r>
+              <a:rPr lang="en-US" sz="1200" dirty="0"/>
+              <a:t>attendance-event-store</a:t>
+            </a:r>
+            <a:endParaRPr lang="en-IN" sz="1200" dirty="0"/>
+          </a:p>
+        </p:txBody>
+      </p:sp>
+      <p:sp>
+        <p:nvSpPr>
+          <p:cNvPr id="50" name="Rectangle: Rounded Corners 49">
+            <a:extLst>
+              <a:ext uri="{FF2B5EF4-FFF2-40B4-BE49-F238E27FC236}">
+                <a16:creationId xmlns:a16="http://schemas.microsoft.com/office/drawing/2014/main" id="{53B9197D-7AA1-49D0-A79F-DDCE2E769E04}"/>
+              </a:ext>
+            </a:extLst>
+          </p:cNvPr>
+          <p:cNvSpPr/>
+          <p:nvPr/>
+        </p:nvSpPr>
+        <p:spPr>
+          <a:xfrm>
+            <a:off x="2217398" y="5616326"/>
+            <a:ext cx="1966225" cy="381999"/>
+          </a:xfrm>
+          <a:prstGeom prst="roundRect">
+            <a:avLst/>
+          </a:prstGeom>
+        </p:spPr>
+        <p:style>
+          <a:lnRef idx="2">
+            <a:schemeClr val="accent1">
+              <a:shade val="50000"/>
+            </a:schemeClr>
+          </a:lnRef>
+          <a:fillRef idx="1">
+            <a:schemeClr val="accent1"/>
+          </a:fillRef>
+          <a:effectRef idx="0">
+            <a:schemeClr val="accent1"/>
+          </a:effectRef>
+          <a:fontRef idx="minor">
+            <a:schemeClr val="lt1"/>
+          </a:fontRef>
+        </p:style>
+        <p:txBody>
+          <a:bodyPr rtlCol="0" anchor="ctr"/>
+          <a:lstStyle/>
+          <a:p>
+            <a:pPr algn="ctr"/>
+            <a:r>
+              <a:rPr lang="en-US" sz="1200" dirty="0"/>
+              <a:t>attendance-system-service</a:t>
+            </a:r>
+            <a:endParaRPr lang="en-IN" sz="1200" dirty="0"/>
+          </a:p>
+        </p:txBody>
+      </p:sp>
+      <p:cxnSp>
+        <p:nvCxnSpPr>
+          <p:cNvPr id="52" name="Straight Arrow Connector 51">
+            <a:extLst>
+              <a:ext uri="{FF2B5EF4-FFF2-40B4-BE49-F238E27FC236}">
+                <a16:creationId xmlns:a16="http://schemas.microsoft.com/office/drawing/2014/main" id="{2D69EBF4-3725-4686-8E36-3BDBF060D0B2}"/>
+              </a:ext>
+            </a:extLst>
+          </p:cNvPr>
+          <p:cNvCxnSpPr>
+            <a:cxnSpLocks/>
+            <a:stCxn id="49" idx="3"/>
+          </p:cNvCxnSpPr>
+          <p:nvPr/>
+        </p:nvCxnSpPr>
+        <p:spPr>
+          <a:xfrm>
+            <a:off x="7065414" y="935891"/>
+            <a:ext cx="3350816" cy="0"/>
+          </a:xfrm>
+          <a:prstGeom prst="straightConnector1">
+            <a:avLst/>
+          </a:prstGeom>
+          <a:ln w="19050">
+            <a:solidFill>
+              <a:schemeClr val="tx1"/>
+            </a:solidFill>
+            <a:tailEnd type="triangle"/>
+          </a:ln>
+        </p:spPr>
+        <p:style>
+          <a:lnRef idx="1">
+            <a:schemeClr val="accent1"/>
+          </a:lnRef>
+          <a:fillRef idx="0">
+            <a:schemeClr val="accent1"/>
+          </a:fillRef>
+          <a:effectRef idx="0">
+            <a:schemeClr val="accent1"/>
+          </a:effectRef>
+          <a:fontRef idx="minor">
+            <a:schemeClr val="tx1"/>
+          </a:fontRef>
+        </p:style>
+      </p:cxnSp>
+      <p:cxnSp>
+        <p:nvCxnSpPr>
+          <p:cNvPr id="61" name="Straight Arrow Connector 60">
+            <a:extLst>
+              <a:ext uri="{FF2B5EF4-FFF2-40B4-BE49-F238E27FC236}">
+                <a16:creationId xmlns:a16="http://schemas.microsoft.com/office/drawing/2014/main" id="{5D6B00E0-6563-475A-BC69-0410FD4934D8}"/>
+              </a:ext>
+            </a:extLst>
+          </p:cNvPr>
+          <p:cNvCxnSpPr>
+            <a:endCxn id="50" idx="3"/>
+          </p:cNvCxnSpPr>
+          <p:nvPr/>
+        </p:nvCxnSpPr>
+        <p:spPr>
+          <a:xfrm flipH="1">
+            <a:off x="4183623" y="5807325"/>
+            <a:ext cx="6298477" cy="1"/>
+          </a:xfrm>
+          <a:prstGeom prst="straightConnector1">
+            <a:avLst/>
+          </a:prstGeom>
+          <a:ln w="19050">
+            <a:solidFill>
+              <a:schemeClr val="tx1"/>
+            </a:solidFill>
+            <a:tailEnd type="triangle"/>
+          </a:ln>
+        </p:spPr>
+        <p:style>
+          <a:lnRef idx="1">
+            <a:schemeClr val="accent1"/>
+          </a:lnRef>
+          <a:fillRef idx="0">
+            <a:schemeClr val="accent1"/>
+          </a:fillRef>
+          <a:effectRef idx="0">
+            <a:schemeClr val="accent1"/>
+          </a:effectRef>
+          <a:fontRef idx="minor">
+            <a:schemeClr val="tx1"/>
+          </a:fontRef>
+        </p:style>
+      </p:cxnSp>
+      <p:sp>
+        <p:nvSpPr>
+          <p:cNvPr id="62" name="TextBox 61">
+            <a:extLst>
+              <a:ext uri="{FF2B5EF4-FFF2-40B4-BE49-F238E27FC236}">
+                <a16:creationId xmlns:a16="http://schemas.microsoft.com/office/drawing/2014/main" id="{5E1B639C-FC79-493E-BC01-D77CCEE768C6}"/>
+              </a:ext>
+            </a:extLst>
+          </p:cNvPr>
+          <p:cNvSpPr txBox="1"/>
+          <p:nvPr/>
+        </p:nvSpPr>
+        <p:spPr>
+          <a:xfrm>
+            <a:off x="6003637" y="5581883"/>
+            <a:ext cx="2300630" cy="253916"/>
+          </a:xfrm>
+          <a:prstGeom prst="rect">
+            <a:avLst/>
+          </a:prstGeom>
+          <a:noFill/>
+        </p:spPr>
+        <p:txBody>
+          <a:bodyPr wrap="none" rtlCol="0">
+            <a:spAutoFit/>
+          </a:bodyPr>
+          <a:lstStyle/>
+          <a:p>
+            <a:r>
+              <a:rPr lang="en-US" sz="1050" dirty="0"/>
+              <a:t>HTTP GET Retrieves attendance details</a:t>
+            </a:r>
+            <a:endParaRPr lang="en-IN" sz="1050" dirty="0"/>
+          </a:p>
+        </p:txBody>
+      </p:sp>
+      <p:sp>
+        <p:nvSpPr>
+          <p:cNvPr id="63" name="TextBox 62">
+            <a:extLst>
+              <a:ext uri="{FF2B5EF4-FFF2-40B4-BE49-F238E27FC236}">
+                <a16:creationId xmlns:a16="http://schemas.microsoft.com/office/drawing/2014/main" id="{B38BD006-1517-4DB8-9956-60549DAA5DAB}"/>
+              </a:ext>
+            </a:extLst>
+          </p:cNvPr>
+          <p:cNvSpPr txBox="1"/>
+          <p:nvPr/>
+        </p:nvSpPr>
+        <p:spPr>
+          <a:xfrm>
+            <a:off x="7415373" y="2899212"/>
+            <a:ext cx="1662635" cy="253916"/>
+          </a:xfrm>
+          <a:prstGeom prst="rect">
+            <a:avLst/>
+          </a:prstGeom>
+          <a:noFill/>
+        </p:spPr>
+        <p:txBody>
+          <a:bodyPr wrap="none" rtlCol="0">
+            <a:spAutoFit/>
+          </a:bodyPr>
+          <a:lstStyle/>
+          <a:p>
+            <a:r>
+              <a:rPr lang="en-US" sz="1050" dirty="0"/>
+              <a:t>Pushes EOD topics to </a:t>
+            </a:r>
+            <a:r>
+              <a:rPr lang="en-US" sz="1050" dirty="0" err="1"/>
+              <a:t>kafka</a:t>
+            </a:r>
+            <a:endParaRPr lang="en-IN" sz="1050" dirty="0"/>
+          </a:p>
+        </p:txBody>
+      </p:sp>
+      <p:sp>
+        <p:nvSpPr>
+          <p:cNvPr id="64" name="TextBox 63">
+            <a:extLst>
+              <a:ext uri="{FF2B5EF4-FFF2-40B4-BE49-F238E27FC236}">
+                <a16:creationId xmlns:a16="http://schemas.microsoft.com/office/drawing/2014/main" id="{D73CE50B-3AE1-4610-B4CD-E95D2E52434E}"/>
+              </a:ext>
+            </a:extLst>
+          </p:cNvPr>
+          <p:cNvSpPr txBox="1"/>
+          <p:nvPr/>
+        </p:nvSpPr>
+        <p:spPr>
+          <a:xfrm>
+            <a:off x="7957368" y="3534831"/>
+            <a:ext cx="1483098" cy="261610"/>
+          </a:xfrm>
+          <a:prstGeom prst="rect">
+            <a:avLst/>
+          </a:prstGeom>
+          <a:noFill/>
+        </p:spPr>
+        <p:txBody>
+          <a:bodyPr wrap="none" rtlCol="0">
+            <a:spAutoFit/>
+          </a:bodyPr>
+          <a:lstStyle/>
+          <a:p>
+            <a:r>
+              <a:rPr lang="en-US" sz="1050" dirty="0"/>
+              <a:t>Consumes </a:t>
+            </a:r>
+            <a:r>
+              <a:rPr lang="en-US" sz="1050" dirty="0" err="1"/>
+              <a:t>kafka</a:t>
+            </a:r>
+            <a:r>
+              <a:rPr lang="en-US" sz="1050" dirty="0"/>
+              <a:t> topics</a:t>
+            </a:r>
+            <a:endParaRPr lang="en-IN" sz="1050" dirty="0"/>
+          </a:p>
+        </p:txBody>
+      </p:sp>
+      <p:sp>
+        <p:nvSpPr>
+          <p:cNvPr id="65" name="TextBox 64">
+            <a:extLst>
+              <a:ext uri="{FF2B5EF4-FFF2-40B4-BE49-F238E27FC236}">
+                <a16:creationId xmlns:a16="http://schemas.microsoft.com/office/drawing/2014/main" id="{A4B7EE73-8126-417F-AAB8-BA0A2F0225C3}"/>
+              </a:ext>
+            </a:extLst>
+          </p:cNvPr>
+          <p:cNvSpPr txBox="1"/>
+          <p:nvPr/>
+        </p:nvSpPr>
+        <p:spPr>
+          <a:xfrm>
+            <a:off x="7516368" y="5195839"/>
+            <a:ext cx="1723549" cy="253916"/>
+          </a:xfrm>
+          <a:prstGeom prst="rect">
+            <a:avLst/>
+          </a:prstGeom>
+          <a:noFill/>
+        </p:spPr>
+        <p:txBody>
+          <a:bodyPr wrap="none" rtlCol="0">
+            <a:spAutoFit/>
+          </a:bodyPr>
+          <a:lstStyle/>
+          <a:p>
+            <a:r>
+              <a:rPr lang="en-US" sz="1050" dirty="0"/>
+              <a:t>Persists attendance Records</a:t>
+            </a:r>
+            <a:endParaRPr lang="en-IN" sz="1050" dirty="0"/>
+          </a:p>
+        </p:txBody>
+      </p:sp>
+      <p:cxnSp>
+        <p:nvCxnSpPr>
+          <p:cNvPr id="69" name="Straight Arrow Connector 68">
+            <a:extLst>
+              <a:ext uri="{FF2B5EF4-FFF2-40B4-BE49-F238E27FC236}">
+                <a16:creationId xmlns:a16="http://schemas.microsoft.com/office/drawing/2014/main" id="{105F9353-A4A2-419F-A25A-2B7FC3D2D1EE}"/>
+              </a:ext>
+            </a:extLst>
+          </p:cNvPr>
+          <p:cNvCxnSpPr>
+            <a:cxnSpLocks/>
+            <a:endCxn id="50" idx="0"/>
+          </p:cNvCxnSpPr>
+          <p:nvPr/>
+        </p:nvCxnSpPr>
+        <p:spPr>
+          <a:xfrm>
+            <a:off x="3200511" y="1126891"/>
+            <a:ext cx="0" cy="4489435"/>
+          </a:xfrm>
+          <a:prstGeom prst="straightConnector1">
+            <a:avLst/>
+          </a:prstGeom>
+          <a:ln>
+            <a:tailEnd type="triangle"/>
+          </a:ln>
+        </p:spPr>
+        <p:style>
+          <a:lnRef idx="1">
+            <a:schemeClr val="accent1"/>
+          </a:lnRef>
+          <a:fillRef idx="0">
+            <a:schemeClr val="accent1"/>
+          </a:fillRef>
+          <a:effectRef idx="0">
+            <a:schemeClr val="accent1"/>
+          </a:effectRef>
+          <a:fontRef idx="minor">
+            <a:schemeClr val="tx1"/>
+          </a:fontRef>
+        </p:style>
+      </p:cxnSp>
+      <p:cxnSp>
+        <p:nvCxnSpPr>
+          <p:cNvPr id="75" name="Straight Arrow Connector 74">
+            <a:extLst>
+              <a:ext uri="{FF2B5EF4-FFF2-40B4-BE49-F238E27FC236}">
+                <a16:creationId xmlns:a16="http://schemas.microsoft.com/office/drawing/2014/main" id="{F965A393-27E1-45AE-9CAD-F7F64D8C8719}"/>
+              </a:ext>
+            </a:extLst>
+          </p:cNvPr>
+          <p:cNvCxnSpPr>
+            <a:cxnSpLocks/>
+            <a:endCxn id="50" idx="1"/>
+          </p:cNvCxnSpPr>
+          <p:nvPr/>
+        </p:nvCxnSpPr>
+        <p:spPr>
+          <a:xfrm flipV="1">
+            <a:off x="1705278" y="5807326"/>
+            <a:ext cx="512120" cy="28473"/>
+          </a:xfrm>
+          <a:prstGeom prst="straightConnector1">
+            <a:avLst/>
+          </a:prstGeom>
+          <a:ln>
+            <a:headEnd type="triangle"/>
+            <a:tailEnd type="triangle"/>
+          </a:ln>
+        </p:spPr>
+        <p:style>
+          <a:lnRef idx="1">
+            <a:schemeClr val="accent1"/>
+          </a:lnRef>
+          <a:fillRef idx="0">
+            <a:schemeClr val="accent1"/>
+          </a:fillRef>
+          <a:effectRef idx="0">
+            <a:schemeClr val="accent1"/>
+          </a:effectRef>
+          <a:fontRef idx="minor">
+            <a:schemeClr val="tx1"/>
+          </a:fontRef>
+        </p:style>
+      </p:cxnSp>
+    </p:spTree>
+    <p:extLst>
+      <p:ext uri="{BB962C8B-B14F-4D97-AF65-F5344CB8AC3E}">
+        <p14:creationId xmlns:p14="http://schemas.microsoft.com/office/powerpoint/2010/main" val="1513923105"/>
       </p:ext>
     </p:extLst>
   </p:cSld>

</xml_diff>